<commit_message>
2022: Replace Margalit's slides.
</commit_message>
<xml_diff>
--- a/2022/slides/margalit.pptx
+++ b/2022/slides/margalit.pptx
@@ -245,7 +245,7 @@
           <a:p>
             <a:fld id="{A29C7CBF-387E-4826-87A3-5DE5CC4B9269}" type="datetimeFigureOut">
               <a:rPr lang="en-IL" smtClean="0"/>
-              <a:t>05/08/2022</a:t>
+              <a:t>29/08/2022</a:t>
             </a:fld>
             <a:endParaRPr lang="en-IL"/>
           </a:p>
@@ -645,33 +645,7 @@
           <a:bodyPr/>
           <a:lstStyle/>
           <a:p>
-            <a:r>
-              <a:rPr lang="en-US" dirty="0"/>
-              <a:t>Difficult both in theory (where the complexity can be very high or the problem is not even decidable) and in practice, and I will mention an illustrative example of Peterson algorithm later.</a:t>
-            </a:r>
-          </a:p>
-          <a:p>
-            <a:pPr marL="0" marR="0" lvl="0" indent="0" algn="l" defTabSz="914400" rtl="0" eaLnBrk="1" fontAlgn="auto" latinLnBrk="0" hangingPunct="1">
-              <a:lnSpc>
-                <a:spcPct val="100000"/>
-              </a:lnSpc>
-              <a:spcBef>
-                <a:spcPts val="0"/>
-              </a:spcBef>
-              <a:spcAft>
-                <a:spcPts val="0"/>
-              </a:spcAft>
-              <a:buClrTx/>
-              <a:buSzTx/>
-              <a:buFontTx/>
-              <a:buNone/>
-              <a:tabLst/>
-              <a:defRPr/>
-            </a:pPr>
-            <a:r>
-              <a:rPr lang="en-US" sz="1200" dirty="0"/>
-              <a:t>What is Robustness? Property of concurrent programs. Behaviors under WMM are always observed under SC. (TEACH THE SLIDE!)</a:t>
-            </a:r>
+            <a:endParaRPr lang="en-US" sz="1200" dirty="0"/>
           </a:p>
         </p:txBody>
       </p:sp>
@@ -772,33 +746,7 @@
               <a:tabLst/>
               <a:defRPr/>
             </a:pPr>
-            <a:r>
-              <a:rPr lang="en-US" sz="1200" dirty="0"/>
-              <a:t>Develop a method to automatically establish…</a:t>
-            </a:r>
-          </a:p>
-          <a:p>
-            <a:pPr marL="0" marR="0" lvl="0" indent="0" algn="l" defTabSz="914400" rtl="0" eaLnBrk="1" fontAlgn="auto" latinLnBrk="0" hangingPunct="1">
-              <a:lnSpc>
-                <a:spcPct val="100000"/>
-              </a:lnSpc>
-              <a:spcBef>
-                <a:spcPts val="0"/>
-              </a:spcBef>
-              <a:spcAft>
-                <a:spcPts val="0"/>
-              </a:spcAft>
-              <a:buClrTx/>
-              <a:buSzTx/>
-              <a:buFontTx/>
-              <a:buNone/>
-              <a:tabLst/>
-              <a:defRPr/>
-            </a:pPr>
-            <a:r>
-              <a:rPr lang="en-US" sz="1200" dirty="0"/>
-              <a:t>Specifically, our focus is the model of C and C++ that was introduced in 2011 and provides a spectrum of memory accesses that trade consistency for performance.</a:t>
-            </a:r>
+            <a:endParaRPr lang="en-US" sz="1200" dirty="0"/>
           </a:p>
         </p:txBody>
       </p:sp>
@@ -1122,41 +1070,6 @@
           <a:bodyPr/>
           <a:lstStyle/>
           <a:p>
-            <a:r>
-              <a:rPr lang="en-US" dirty="0"/>
-              <a:t>Let me say a few words about how the proof works</a:t>
-            </a:r>
-          </a:p>
-          <a:p>
-            <a:r>
-              <a:rPr dirty="0"/>
-              <a:t>we identify properties of execution graphs that:</a:t>
-            </a:r>
-          </a:p>
-          <a:p>
-            <a:r>
-              <a:rPr dirty="0"/>
-              <a:t>can be tracked;</a:t>
-            </a:r>
-          </a:p>
-          <a:p>
-            <a:r>
-              <a:rPr dirty="0"/>
-              <a:t>suffice to detect a “non-robustness witness”.</a:t>
-            </a:r>
-            <a:endParaRPr lang="en-US" dirty="0"/>
-          </a:p>
-          <a:p>
-            <a:r>
-              <a:rPr lang="en-US" dirty="0"/>
-              <a:t>Finite bounded additional data we can precisely check this condition.</a:t>
-            </a:r>
-          </a:p>
-          <a:p>
-            <a:r>
-              <a:rPr lang="en-US" dirty="0"/>
-              <a:t>Proof shows we don’t need to remember the whole graph</a:t>
-            </a:r>
             <a:endParaRPr dirty="0"/>
           </a:p>
         </p:txBody>
@@ -1235,39 +1148,6 @@
               <a:tabLst/>
               <a:defRPr/>
             </a:pPr>
-            <a:r>
-              <a:rPr lang="en-US" sz="1200" dirty="0"/>
-              <a:t>Let’s see how this work for the MP example from earlier</a:t>
-            </a:r>
-          </a:p>
-          <a:p>
-            <a:pPr marL="0" marR="0" lvl="0" indent="0" algn="l" defTabSz="914400" rtl="0" eaLnBrk="1" fontAlgn="auto" latinLnBrk="0" hangingPunct="1">
-              <a:lnSpc>
-                <a:spcPct val="100000"/>
-              </a:lnSpc>
-              <a:spcBef>
-                <a:spcPts val="0"/>
-              </a:spcBef>
-              <a:spcAft>
-                <a:spcPts val="0"/>
-              </a:spcAft>
-              <a:buClrTx/>
-              <a:buSzTx/>
-              <a:buFontTx/>
-              <a:buNone/>
-              <a:tabLst/>
-              <a:defRPr/>
-            </a:pPr>
-            <a:r>
-              <a:rPr lang="en-US" sz="1200" dirty="0"/>
-              <a:t>The instrumentation tells us that in C11 the execution doesn’t have to read Wx1 but in SC it must. Thus, we can detect robustness violation.</a:t>
-            </a:r>
-          </a:p>
-          <a:p>
-            <a:r>
-              <a:rPr lang="en-US" dirty="0"/>
-              <a:t>So, the crux of this contribution is to identify a finite instrumentation that will allow us to monitor precisely this kind of property.</a:t>
-            </a:r>
             <a:endParaRPr lang="en-IL" dirty="0"/>
           </a:p>
         </p:txBody>
@@ -1369,10 +1249,6 @@
               <a:tabLst/>
               <a:defRPr/>
             </a:pPr>
-            <a:r>
-              <a:rPr lang="en-US" dirty="0"/>
-              <a:t>Developed. Verification method &amp; a tool.</a:t>
-            </a:r>
             <a:endParaRPr lang="en-IL" dirty="0"/>
           </a:p>
         </p:txBody>
@@ -1544,7 +1420,7 @@
           <a:p>
             <a:fld id="{6B214C3F-A8DB-462A-862B-B1D44ACAFCBC}" type="datetimeFigureOut">
               <a:rPr lang="en-IL" smtClean="0"/>
-              <a:t>05/08/2022</a:t>
+              <a:t>29/08/2022</a:t>
             </a:fld>
             <a:endParaRPr lang="en-IL"/>
           </a:p>
@@ -1714,7 +1590,7 @@
           <a:p>
             <a:fld id="{6B214C3F-A8DB-462A-862B-B1D44ACAFCBC}" type="datetimeFigureOut">
               <a:rPr lang="en-IL" smtClean="0"/>
-              <a:t>05/08/2022</a:t>
+              <a:t>29/08/2022</a:t>
             </a:fld>
             <a:endParaRPr lang="en-IL"/>
           </a:p>
@@ -1894,7 +1770,7 @@
           <a:p>
             <a:fld id="{6B214C3F-A8DB-462A-862B-B1D44ACAFCBC}" type="datetimeFigureOut">
               <a:rPr lang="en-IL" smtClean="0"/>
-              <a:t>05/08/2022</a:t>
+              <a:t>29/08/2022</a:t>
             </a:fld>
             <a:endParaRPr lang="en-IL"/>
           </a:p>
@@ -2195,7 +2071,7 @@
           <a:p>
             <a:fld id="{6B214C3F-A8DB-462A-862B-B1D44ACAFCBC}" type="datetimeFigureOut">
               <a:rPr lang="en-IL" smtClean="0"/>
-              <a:t>05/08/2022</a:t>
+              <a:t>29/08/2022</a:t>
             </a:fld>
             <a:endParaRPr lang="en-IL"/>
           </a:p>
@@ -2441,7 +2317,7 @@
           <a:p>
             <a:fld id="{6B214C3F-A8DB-462A-862B-B1D44ACAFCBC}" type="datetimeFigureOut">
               <a:rPr lang="en-IL" smtClean="0"/>
-              <a:t>05/08/2022</a:t>
+              <a:t>29/08/2022</a:t>
             </a:fld>
             <a:endParaRPr lang="en-IL"/>
           </a:p>
@@ -2673,7 +2549,7 @@
           <a:p>
             <a:fld id="{6B214C3F-A8DB-462A-862B-B1D44ACAFCBC}" type="datetimeFigureOut">
               <a:rPr lang="en-IL" smtClean="0"/>
-              <a:t>05/08/2022</a:t>
+              <a:t>29/08/2022</a:t>
             </a:fld>
             <a:endParaRPr lang="en-IL"/>
           </a:p>
@@ -3040,7 +2916,7 @@
           <a:p>
             <a:fld id="{6B214C3F-A8DB-462A-862B-B1D44ACAFCBC}" type="datetimeFigureOut">
               <a:rPr lang="en-IL" smtClean="0"/>
-              <a:t>05/08/2022</a:t>
+              <a:t>29/08/2022</a:t>
             </a:fld>
             <a:endParaRPr lang="en-IL"/>
           </a:p>
@@ -3158,7 +3034,7 @@
           <a:p>
             <a:fld id="{6B214C3F-A8DB-462A-862B-B1D44ACAFCBC}" type="datetimeFigureOut">
               <a:rPr lang="en-IL" smtClean="0"/>
-              <a:t>05/08/2022</a:t>
+              <a:t>29/08/2022</a:t>
             </a:fld>
             <a:endParaRPr lang="en-IL"/>
           </a:p>
@@ -3253,7 +3129,7 @@
           <a:p>
             <a:fld id="{6B214C3F-A8DB-462A-862B-B1D44ACAFCBC}" type="datetimeFigureOut">
               <a:rPr lang="en-IL" smtClean="0"/>
-              <a:t>05/08/2022</a:t>
+              <a:t>29/08/2022</a:t>
             </a:fld>
             <a:endParaRPr lang="en-IL"/>
           </a:p>
@@ -3530,7 +3406,7 @@
           <a:p>
             <a:fld id="{6B214C3F-A8DB-462A-862B-B1D44ACAFCBC}" type="datetimeFigureOut">
               <a:rPr lang="en-IL" smtClean="0"/>
-              <a:t>05/08/2022</a:t>
+              <a:t>29/08/2022</a:t>
             </a:fld>
             <a:endParaRPr lang="en-IL"/>
           </a:p>
@@ -3787,7 +3663,7 @@
           <a:p>
             <a:fld id="{6B214C3F-A8DB-462A-862B-B1D44ACAFCBC}" type="datetimeFigureOut">
               <a:rPr lang="en-IL" smtClean="0"/>
-              <a:t>05/08/2022</a:t>
+              <a:t>29/08/2022</a:t>
             </a:fld>
             <a:endParaRPr lang="en-IL"/>
           </a:p>
@@ -4000,7 +3876,7 @@
           <a:p>
             <a:fld id="{6B214C3F-A8DB-462A-862B-B1D44ACAFCBC}" type="datetimeFigureOut">
               <a:rPr lang="en-IL" smtClean="0"/>
-              <a:t>05/08/2022</a:t>
+              <a:t>29/08/2022</a:t>
             </a:fld>
             <a:endParaRPr lang="en-IL"/>
           </a:p>
@@ -16466,7 +16342,7 @@
             <a:effectLst/>
             <a:extLst>
               <a:ext uri="{C572A759-6A51-4108-AA02-DFA0A04FC94B}">
-                <ma14:wrappingTextBoxFlag xmlns:ma14="http://schemas.microsoft.com/office/mac/drawingml/2011/main" xmlns:a14="http://schemas.microsoft.com/office/drawing/2010/main" xmlns:m="http://schemas.openxmlformats.org/officeDocument/2006/math" xmlns="" val="1"/>
+                <ma14:wrappingTextBoxFlag xmlns="" xmlns:m="http://schemas.openxmlformats.org/officeDocument/2006/math" xmlns:a14="http://schemas.microsoft.com/office/drawing/2010/main" xmlns:ma14="http://schemas.microsoft.com/office/mac/drawingml/2011/main" val="1"/>
               </a:ext>
             </a:extLst>
           </p:spPr>
@@ -16514,7 +16390,7 @@
             <a:effectLst/>
             <a:extLst>
               <a:ext uri="{C572A759-6A51-4108-AA02-DFA0A04FC94B}">
-                <ma14:wrappingTextBoxFlag xmlns:ma14="http://schemas.microsoft.com/office/mac/drawingml/2011/main" xmlns:a14="http://schemas.microsoft.com/office/drawing/2010/main" xmlns:m="http://schemas.openxmlformats.org/officeDocument/2006/math" xmlns="" val="1"/>
+                <ma14:wrappingTextBoxFlag xmlns="" xmlns:m="http://schemas.openxmlformats.org/officeDocument/2006/math" xmlns:a14="http://schemas.microsoft.com/office/drawing/2010/main" xmlns:ma14="http://schemas.microsoft.com/office/mac/drawingml/2011/main" val="1"/>
               </a:ext>
             </a:extLst>
           </p:spPr>
@@ -16562,7 +16438,7 @@
             <a:effectLst/>
             <a:extLst>
               <a:ext uri="{C572A759-6A51-4108-AA02-DFA0A04FC94B}">
-                <ma14:wrappingTextBoxFlag xmlns:ma14="http://schemas.microsoft.com/office/mac/drawingml/2011/main" xmlns:a14="http://schemas.microsoft.com/office/drawing/2010/main" xmlns:m="http://schemas.openxmlformats.org/officeDocument/2006/math" xmlns="" val="1"/>
+                <ma14:wrappingTextBoxFlag xmlns="" xmlns:m="http://schemas.openxmlformats.org/officeDocument/2006/math" xmlns:a14="http://schemas.microsoft.com/office/drawing/2010/main" xmlns:ma14="http://schemas.microsoft.com/office/mac/drawingml/2011/main" val="1"/>
               </a:ext>
             </a:extLst>
           </p:spPr>
@@ -16610,7 +16486,7 @@
             <a:effectLst/>
             <a:extLst>
               <a:ext uri="{C572A759-6A51-4108-AA02-DFA0A04FC94B}">
-                <ma14:wrappingTextBoxFlag xmlns:ma14="http://schemas.microsoft.com/office/mac/drawingml/2011/main" xmlns:a14="http://schemas.microsoft.com/office/drawing/2010/main" xmlns:m="http://schemas.openxmlformats.org/officeDocument/2006/math" xmlns="" val="1"/>
+                <ma14:wrappingTextBoxFlag xmlns="" xmlns:m="http://schemas.openxmlformats.org/officeDocument/2006/math" xmlns:a14="http://schemas.microsoft.com/office/drawing/2010/main" xmlns:ma14="http://schemas.microsoft.com/office/mac/drawingml/2011/main" val="1"/>
               </a:ext>
             </a:extLst>
           </p:spPr>
@@ -16658,7 +16534,7 @@
             <a:effectLst/>
             <a:extLst>
               <a:ext uri="{C572A759-6A51-4108-AA02-DFA0A04FC94B}">
-                <ma14:wrappingTextBoxFlag xmlns:ma14="http://schemas.microsoft.com/office/mac/drawingml/2011/main" xmlns:a14="http://schemas.microsoft.com/office/drawing/2010/main" xmlns:m="http://schemas.openxmlformats.org/officeDocument/2006/math" xmlns="" val="1"/>
+                <ma14:wrappingTextBoxFlag xmlns="" xmlns:m="http://schemas.openxmlformats.org/officeDocument/2006/math" xmlns:a14="http://schemas.microsoft.com/office/drawing/2010/main" xmlns:ma14="http://schemas.microsoft.com/office/mac/drawingml/2011/main" val="1"/>
               </a:ext>
             </a:extLst>
           </p:spPr>
@@ -16706,7 +16582,7 @@
             <a:effectLst/>
             <a:extLst>
               <a:ext uri="{C572A759-6A51-4108-AA02-DFA0A04FC94B}">
-                <ma14:wrappingTextBoxFlag xmlns:ma14="http://schemas.microsoft.com/office/mac/drawingml/2011/main" xmlns:a14="http://schemas.microsoft.com/office/drawing/2010/main" xmlns:m="http://schemas.openxmlformats.org/officeDocument/2006/math" xmlns="" val="1"/>
+                <ma14:wrappingTextBoxFlag xmlns="" xmlns:m="http://schemas.openxmlformats.org/officeDocument/2006/math" xmlns:a14="http://schemas.microsoft.com/office/drawing/2010/main" xmlns:ma14="http://schemas.microsoft.com/office/mac/drawingml/2011/main" val="1"/>
               </a:ext>
             </a:extLst>
           </p:spPr>
@@ -17441,7 +17317,7 @@
           </a:ln>
           <a:extLst>
             <a:ext uri="{C572A759-6A51-4108-AA02-DFA0A04FC94B}">
-              <ma14:wrappingTextBoxFlag xmlns:ma14="http://schemas.microsoft.com/office/mac/drawingml/2011/main" xmlns:a14="http://schemas.microsoft.com/office/drawing/2010/main" xmlns:m="http://schemas.openxmlformats.org/officeDocument/2006/math" xmlns="" val="1"/>
+              <ma14:wrappingTextBoxFlag xmlns="" xmlns:m="http://schemas.openxmlformats.org/officeDocument/2006/math" xmlns:a14="http://schemas.microsoft.com/office/drawing/2010/main" xmlns:ma14="http://schemas.microsoft.com/office/mac/drawingml/2011/main" val="1"/>
             </a:ext>
           </a:extLst>
         </p:spPr>
@@ -17730,7 +17606,7 @@
             <a:effectLst/>
             <a:extLst>
               <a:ext uri="{C572A759-6A51-4108-AA02-DFA0A04FC94B}">
-                <ma14:wrappingTextBoxFlag xmlns:ma14="http://schemas.microsoft.com/office/mac/drawingml/2011/main" xmlns:a14="http://schemas.microsoft.com/office/drawing/2010/main" xmlns:m="http://schemas.openxmlformats.org/officeDocument/2006/math" xmlns="" val="1"/>
+                <ma14:wrappingTextBoxFlag xmlns="" xmlns:m="http://schemas.openxmlformats.org/officeDocument/2006/math" xmlns:a14="http://schemas.microsoft.com/office/drawing/2010/main" xmlns:ma14="http://schemas.microsoft.com/office/mac/drawingml/2011/main" val="1"/>
               </a:ext>
             </a:extLst>
           </p:spPr>
@@ -17769,7 +17645,7 @@
             <a:effectLst/>
             <a:extLst>
               <a:ext uri="{C572A759-6A51-4108-AA02-DFA0A04FC94B}">
-                <ma14:wrappingTextBoxFlag xmlns:ma14="http://schemas.microsoft.com/office/mac/drawingml/2011/main" xmlns:a14="http://schemas.microsoft.com/office/drawing/2010/main" xmlns:m="http://schemas.openxmlformats.org/officeDocument/2006/math" xmlns="" val="1"/>
+                <ma14:wrappingTextBoxFlag xmlns="" xmlns:m="http://schemas.openxmlformats.org/officeDocument/2006/math" xmlns:a14="http://schemas.microsoft.com/office/drawing/2010/main" xmlns:ma14="http://schemas.microsoft.com/office/mac/drawingml/2011/main" val="1"/>
               </a:ext>
             </a:extLst>
           </p:spPr>
@@ -17812,7 +17688,7 @@
             <a:effectLst/>
             <a:extLst>
               <a:ext uri="{C572A759-6A51-4108-AA02-DFA0A04FC94B}">
-                <ma14:wrappingTextBoxFlag xmlns:ma14="http://schemas.microsoft.com/office/mac/drawingml/2011/main" xmlns:a14="http://schemas.microsoft.com/office/drawing/2010/main" xmlns:m="http://schemas.openxmlformats.org/officeDocument/2006/math" xmlns="" val="1"/>
+                <ma14:wrappingTextBoxFlag xmlns="" xmlns:m="http://schemas.openxmlformats.org/officeDocument/2006/math" xmlns:a14="http://schemas.microsoft.com/office/drawing/2010/main" xmlns:ma14="http://schemas.microsoft.com/office/mac/drawingml/2011/main" val="1"/>
               </a:ext>
             </a:extLst>
           </p:spPr>
@@ -17855,7 +17731,7 @@
             <a:effectLst/>
             <a:extLst>
               <a:ext uri="{C572A759-6A51-4108-AA02-DFA0A04FC94B}">
-                <ma14:wrappingTextBoxFlag xmlns:ma14="http://schemas.microsoft.com/office/mac/drawingml/2011/main" xmlns:a14="http://schemas.microsoft.com/office/drawing/2010/main" xmlns:m="http://schemas.openxmlformats.org/officeDocument/2006/math" xmlns="" val="1"/>
+                <ma14:wrappingTextBoxFlag xmlns="" xmlns:m="http://schemas.openxmlformats.org/officeDocument/2006/math" xmlns:a14="http://schemas.microsoft.com/office/drawing/2010/main" xmlns:ma14="http://schemas.microsoft.com/office/mac/drawingml/2011/main" val="1"/>
               </a:ext>
             </a:extLst>
           </p:spPr>
@@ -17898,7 +17774,7 @@
             <a:effectLst/>
             <a:extLst>
               <a:ext uri="{C572A759-6A51-4108-AA02-DFA0A04FC94B}">
-                <ma14:wrappingTextBoxFlag xmlns:ma14="http://schemas.microsoft.com/office/mac/drawingml/2011/main" xmlns:a14="http://schemas.microsoft.com/office/drawing/2010/main" xmlns:m="http://schemas.openxmlformats.org/officeDocument/2006/math" xmlns="" val="1"/>
+                <ma14:wrappingTextBoxFlag xmlns="" xmlns:m="http://schemas.openxmlformats.org/officeDocument/2006/math" xmlns:a14="http://schemas.microsoft.com/office/drawing/2010/main" xmlns:ma14="http://schemas.microsoft.com/office/mac/drawingml/2011/main" val="1"/>
               </a:ext>
             </a:extLst>
           </p:spPr>
@@ -18342,7 +18218,7 @@
           </a:ln>
           <a:extLst>
             <a:ext uri="{C572A759-6A51-4108-AA02-DFA0A04FC94B}">
-              <ma14:wrappingTextBoxFlag xmlns:ma14="http://schemas.microsoft.com/office/mac/drawingml/2011/main" xmlns:a14="http://schemas.microsoft.com/office/drawing/2010/main" xmlns:m="http://schemas.openxmlformats.org/officeDocument/2006/math" xmlns="" val="1"/>
+              <ma14:wrappingTextBoxFlag xmlns="" xmlns:m="http://schemas.openxmlformats.org/officeDocument/2006/math" xmlns:a14="http://schemas.microsoft.com/office/drawing/2010/main" xmlns:ma14="http://schemas.microsoft.com/office/mac/drawingml/2011/main" val="1"/>
             </a:ext>
           </a:extLst>
         </p:spPr>
@@ -18533,7 +18409,7 @@
             <a:effectLst/>
             <a:extLst>
               <a:ext uri="{C572A759-6A51-4108-AA02-DFA0A04FC94B}">
-                <ma14:wrappingTextBoxFlag xmlns:ma14="http://schemas.microsoft.com/office/mac/drawingml/2011/main" xmlns:a14="http://schemas.microsoft.com/office/drawing/2010/main" xmlns:m="http://schemas.openxmlformats.org/officeDocument/2006/math" xmlns="" val="1"/>
+                <ma14:wrappingTextBoxFlag xmlns="" xmlns:m="http://schemas.openxmlformats.org/officeDocument/2006/math" xmlns:a14="http://schemas.microsoft.com/office/drawing/2010/main" xmlns:ma14="http://schemas.microsoft.com/office/mac/drawingml/2011/main" val="1"/>
               </a:ext>
             </a:extLst>
           </p:spPr>
@@ -18630,7 +18506,7 @@
             <a:effectLst/>
             <a:extLst>
               <a:ext uri="{C572A759-6A51-4108-AA02-DFA0A04FC94B}">
-                <ma14:wrappingTextBoxFlag xmlns:ma14="http://schemas.microsoft.com/office/mac/drawingml/2011/main" xmlns:a14="http://schemas.microsoft.com/office/drawing/2010/main" xmlns:m="http://schemas.openxmlformats.org/officeDocument/2006/math" xmlns="" val="1"/>
+                <ma14:wrappingTextBoxFlag xmlns="" xmlns:m="http://schemas.openxmlformats.org/officeDocument/2006/math" xmlns:a14="http://schemas.microsoft.com/office/drawing/2010/main" xmlns:ma14="http://schemas.microsoft.com/office/mac/drawingml/2011/main" val="1"/>
               </a:ext>
             </a:extLst>
           </p:spPr>
@@ -19023,7 +18899,7 @@
           </a:ln>
           <a:extLst>
             <a:ext uri="{C572A759-6A51-4108-AA02-DFA0A04FC94B}">
-              <ma14:wrappingTextBoxFlag xmlns:ma14="http://schemas.microsoft.com/office/mac/drawingml/2011/main" xmlns:a14="http://schemas.microsoft.com/office/drawing/2010/main" xmlns:m="http://schemas.openxmlformats.org/officeDocument/2006/math" xmlns="" val="1"/>
+              <ma14:wrappingTextBoxFlag xmlns="" xmlns:m="http://schemas.openxmlformats.org/officeDocument/2006/math" xmlns:a14="http://schemas.microsoft.com/office/drawing/2010/main" xmlns:ma14="http://schemas.microsoft.com/office/mac/drawingml/2011/main" val="1"/>
             </a:ext>
           </a:extLst>
         </p:spPr>
@@ -19526,7 +19402,7 @@
             <a:effectLst/>
             <a:extLst>
               <a:ext uri="{C572A759-6A51-4108-AA02-DFA0A04FC94B}">
-                <ma14:wrappingTextBoxFlag xmlns:ma14="http://schemas.microsoft.com/office/mac/drawingml/2011/main" xmlns:a14="http://schemas.microsoft.com/office/drawing/2010/main" xmlns:m="http://schemas.openxmlformats.org/officeDocument/2006/math" xmlns="" val="1"/>
+                <ma14:wrappingTextBoxFlag xmlns="" xmlns:m="http://schemas.openxmlformats.org/officeDocument/2006/math" xmlns:a14="http://schemas.microsoft.com/office/drawing/2010/main" xmlns:ma14="http://schemas.microsoft.com/office/mac/drawingml/2011/main" val="1"/>
               </a:ext>
             </a:extLst>
           </p:spPr>
@@ -19588,7 +19464,7 @@
             <a:effectLst/>
             <a:extLst>
               <a:ext uri="{C572A759-6A51-4108-AA02-DFA0A04FC94B}">
-                <ma14:wrappingTextBoxFlag xmlns:ma14="http://schemas.microsoft.com/office/mac/drawingml/2011/main" xmlns:a14="http://schemas.microsoft.com/office/drawing/2010/main" xmlns:m="http://schemas.openxmlformats.org/officeDocument/2006/math" xmlns="" val="1"/>
+                <ma14:wrappingTextBoxFlag xmlns="" xmlns:m="http://schemas.openxmlformats.org/officeDocument/2006/math" xmlns:a14="http://schemas.microsoft.com/office/drawing/2010/main" xmlns:ma14="http://schemas.microsoft.com/office/mac/drawingml/2011/main" val="1"/>
               </a:ext>
             </a:extLst>
           </p:spPr>
@@ -19640,7 +19516,7 @@
             <a:effectLst/>
             <a:extLst>
               <a:ext uri="{C572A759-6A51-4108-AA02-DFA0A04FC94B}">
-                <ma14:wrappingTextBoxFlag xmlns:ma14="http://schemas.microsoft.com/office/mac/drawingml/2011/main" xmlns:a14="http://schemas.microsoft.com/office/drawing/2010/main" xmlns:m="http://schemas.openxmlformats.org/officeDocument/2006/math" xmlns="" val="1"/>
+                <ma14:wrappingTextBoxFlag xmlns="" xmlns:m="http://schemas.openxmlformats.org/officeDocument/2006/math" xmlns:a14="http://schemas.microsoft.com/office/drawing/2010/main" xmlns:ma14="http://schemas.microsoft.com/office/mac/drawingml/2011/main" val="1"/>
               </a:ext>
             </a:extLst>
           </p:spPr>
@@ -19694,7 +19570,7 @@
             <a:effectLst/>
             <a:extLst>
               <a:ext uri="{C572A759-6A51-4108-AA02-DFA0A04FC94B}">
-                <ma14:wrappingTextBoxFlag xmlns:ma14="http://schemas.microsoft.com/office/mac/drawingml/2011/main" xmlns:a14="http://schemas.microsoft.com/office/drawing/2010/main" xmlns:m="http://schemas.openxmlformats.org/officeDocument/2006/math" xmlns="" val="1"/>
+                <ma14:wrappingTextBoxFlag xmlns="" xmlns:m="http://schemas.openxmlformats.org/officeDocument/2006/math" xmlns:a14="http://schemas.microsoft.com/office/drawing/2010/main" xmlns:ma14="http://schemas.microsoft.com/office/mac/drawingml/2011/main" val="1"/>
               </a:ext>
             </a:extLst>
           </p:spPr>
@@ -19802,7 +19678,7 @@
             <a:effectLst/>
             <a:extLst>
               <a:ext uri="{C572A759-6A51-4108-AA02-DFA0A04FC94B}">
-                <ma14:wrappingTextBoxFlag xmlns:ma14="http://schemas.microsoft.com/office/mac/drawingml/2011/main" xmlns:a14="http://schemas.microsoft.com/office/drawing/2010/main" xmlns:m="http://schemas.openxmlformats.org/officeDocument/2006/math" xmlns="" val="1"/>
+                <ma14:wrappingTextBoxFlag xmlns="" xmlns:m="http://schemas.openxmlformats.org/officeDocument/2006/math" xmlns:a14="http://schemas.microsoft.com/office/drawing/2010/main" xmlns:ma14="http://schemas.microsoft.com/office/mac/drawingml/2011/main" val="1"/>
               </a:ext>
             </a:extLst>
           </p:spPr>
@@ -20271,7 +20147,7 @@
           </a:ln>
           <a:extLst>
             <a:ext uri="{C572A759-6A51-4108-AA02-DFA0A04FC94B}">
-              <ma14:wrappingTextBoxFlag xmlns:ma14="http://schemas.microsoft.com/office/mac/drawingml/2011/main" xmlns:a14="http://schemas.microsoft.com/office/drawing/2010/main" xmlns:m="http://schemas.openxmlformats.org/officeDocument/2006/math" xmlns="" val="1"/>
+              <ma14:wrappingTextBoxFlag xmlns="" xmlns:m="http://schemas.openxmlformats.org/officeDocument/2006/math" xmlns:a14="http://schemas.microsoft.com/office/drawing/2010/main" xmlns:ma14="http://schemas.microsoft.com/office/mac/drawingml/2011/main" val="1"/>
             </a:ext>
           </a:extLst>
         </p:spPr>
@@ -20336,7 +20212,7 @@
             <a:effectLst/>
             <a:extLst>
               <a:ext uri="{C572A759-6A51-4108-AA02-DFA0A04FC94B}">
-                <ma14:wrappingTextBoxFlag xmlns:ma14="http://schemas.microsoft.com/office/mac/drawingml/2011/main" xmlns:a14="http://schemas.microsoft.com/office/drawing/2010/main" xmlns:m="http://schemas.openxmlformats.org/officeDocument/2006/math" xmlns="" val="1"/>
+                <ma14:wrappingTextBoxFlag xmlns="" xmlns:m="http://schemas.openxmlformats.org/officeDocument/2006/math" xmlns:a14="http://schemas.microsoft.com/office/drawing/2010/main" xmlns:ma14="http://schemas.microsoft.com/office/mac/drawingml/2011/main" val="1"/>
               </a:ext>
             </a:extLst>
           </p:spPr>
@@ -20392,7 +20268,7 @@
             <a:effectLst/>
             <a:extLst>
               <a:ext uri="{C572A759-6A51-4108-AA02-DFA0A04FC94B}">
-                <ma14:wrappingTextBoxFlag xmlns:ma14="http://schemas.microsoft.com/office/mac/drawingml/2011/main" xmlns:a14="http://schemas.microsoft.com/office/drawing/2010/main" xmlns:m="http://schemas.openxmlformats.org/officeDocument/2006/math" xmlns="" val="1"/>
+                <ma14:wrappingTextBoxFlag xmlns="" xmlns:m="http://schemas.openxmlformats.org/officeDocument/2006/math" xmlns:a14="http://schemas.microsoft.com/office/drawing/2010/main" xmlns:ma14="http://schemas.microsoft.com/office/mac/drawingml/2011/main" val="1"/>
               </a:ext>
             </a:extLst>
           </p:spPr>
@@ -20438,7 +20314,7 @@
             <a:effectLst/>
             <a:extLst>
               <a:ext uri="{C572A759-6A51-4108-AA02-DFA0A04FC94B}">
-                <ma14:wrappingTextBoxFlag xmlns:ma14="http://schemas.microsoft.com/office/mac/drawingml/2011/main" xmlns:a14="http://schemas.microsoft.com/office/drawing/2010/main" xmlns:m="http://schemas.openxmlformats.org/officeDocument/2006/math" xmlns="" val="1"/>
+                <ma14:wrappingTextBoxFlag xmlns="" xmlns:m="http://schemas.openxmlformats.org/officeDocument/2006/math" xmlns:a14="http://schemas.microsoft.com/office/drawing/2010/main" xmlns:ma14="http://schemas.microsoft.com/office/mac/drawingml/2011/main" val="1"/>
               </a:ext>
             </a:extLst>
           </p:spPr>
@@ -20485,7 +20361,7 @@
             <a:effectLst/>
             <a:extLst>
               <a:ext uri="{C572A759-6A51-4108-AA02-DFA0A04FC94B}">
-                <ma14:wrappingTextBoxFlag xmlns:ma14="http://schemas.microsoft.com/office/mac/drawingml/2011/main" xmlns:a14="http://schemas.microsoft.com/office/drawing/2010/main" xmlns:m="http://schemas.openxmlformats.org/officeDocument/2006/math" xmlns="" val="1"/>
+                <ma14:wrappingTextBoxFlag xmlns="" xmlns:m="http://schemas.openxmlformats.org/officeDocument/2006/math" xmlns:a14="http://schemas.microsoft.com/office/drawing/2010/main" xmlns:ma14="http://schemas.microsoft.com/office/mac/drawingml/2011/main" val="1"/>
               </a:ext>
             </a:extLst>
           </p:spPr>
@@ -20581,7 +20457,7 @@
             <a:effectLst/>
             <a:extLst>
               <a:ext uri="{C572A759-6A51-4108-AA02-DFA0A04FC94B}">
-                <ma14:wrappingTextBoxFlag xmlns:ma14="http://schemas.microsoft.com/office/mac/drawingml/2011/main" xmlns:a14="http://schemas.microsoft.com/office/drawing/2010/main" xmlns:m="http://schemas.openxmlformats.org/officeDocument/2006/math" xmlns="" val="1"/>
+                <ma14:wrappingTextBoxFlag xmlns="" xmlns:m="http://schemas.openxmlformats.org/officeDocument/2006/math" xmlns:a14="http://schemas.microsoft.com/office/drawing/2010/main" xmlns:ma14="http://schemas.microsoft.com/office/mac/drawingml/2011/main" val="1"/>
               </a:ext>
             </a:extLst>
           </p:spPr>
@@ -21128,7 +21004,7 @@
             <a:effectLst/>
             <a:extLst>
               <a:ext uri="{C572A759-6A51-4108-AA02-DFA0A04FC94B}">
-                <ma14:wrappingTextBoxFlag xmlns:ma14="http://schemas.microsoft.com/office/mac/drawingml/2011/main" xmlns:a14="http://schemas.microsoft.com/office/drawing/2010/main" xmlns:m="http://schemas.openxmlformats.org/officeDocument/2006/math" xmlns="" val="1"/>
+                <ma14:wrappingTextBoxFlag xmlns="" xmlns:m="http://schemas.openxmlformats.org/officeDocument/2006/math" xmlns:a14="http://schemas.microsoft.com/office/drawing/2010/main" xmlns:ma14="http://schemas.microsoft.com/office/mac/drawingml/2011/main" val="1"/>
               </a:ext>
             </a:extLst>
           </p:spPr>
@@ -21182,7 +21058,7 @@
             <a:effectLst/>
             <a:extLst>
               <a:ext uri="{C572A759-6A51-4108-AA02-DFA0A04FC94B}">
-                <ma14:wrappingTextBoxFlag xmlns:ma14="http://schemas.microsoft.com/office/mac/drawingml/2011/main" xmlns:a14="http://schemas.microsoft.com/office/drawing/2010/main" xmlns:m="http://schemas.openxmlformats.org/officeDocument/2006/math" xmlns="" val="1"/>
+                <ma14:wrappingTextBoxFlag xmlns="" xmlns:m="http://schemas.openxmlformats.org/officeDocument/2006/math" xmlns:a14="http://schemas.microsoft.com/office/drawing/2010/main" xmlns:ma14="http://schemas.microsoft.com/office/mac/drawingml/2011/main" val="1"/>
               </a:ext>
             </a:extLst>
           </p:spPr>
@@ -21236,7 +21112,7 @@
             <a:effectLst/>
             <a:extLst>
               <a:ext uri="{C572A759-6A51-4108-AA02-DFA0A04FC94B}">
-                <ma14:wrappingTextBoxFlag xmlns:ma14="http://schemas.microsoft.com/office/mac/drawingml/2011/main" xmlns:a14="http://schemas.microsoft.com/office/drawing/2010/main" xmlns:m="http://schemas.openxmlformats.org/officeDocument/2006/math" xmlns="" val="1"/>
+                <ma14:wrappingTextBoxFlag xmlns="" xmlns:m="http://schemas.openxmlformats.org/officeDocument/2006/math" xmlns:a14="http://schemas.microsoft.com/office/drawing/2010/main" xmlns:ma14="http://schemas.microsoft.com/office/mac/drawingml/2011/main" val="1"/>
               </a:ext>
             </a:extLst>
           </p:spPr>
@@ -21290,7 +21166,7 @@
             <a:effectLst/>
             <a:extLst>
               <a:ext uri="{C572A759-6A51-4108-AA02-DFA0A04FC94B}">
-                <ma14:wrappingTextBoxFlag xmlns:ma14="http://schemas.microsoft.com/office/mac/drawingml/2011/main" xmlns:a14="http://schemas.microsoft.com/office/drawing/2010/main" xmlns:m="http://schemas.openxmlformats.org/officeDocument/2006/math" xmlns="" val="1"/>
+                <ma14:wrappingTextBoxFlag xmlns="" xmlns:m="http://schemas.openxmlformats.org/officeDocument/2006/math" xmlns:a14="http://schemas.microsoft.com/office/drawing/2010/main" xmlns:ma14="http://schemas.microsoft.com/office/mac/drawingml/2011/main" val="1"/>
               </a:ext>
             </a:extLst>
           </p:spPr>
@@ -21348,7 +21224,7 @@
             <a:effectLst/>
             <a:extLst>
               <a:ext uri="{C572A759-6A51-4108-AA02-DFA0A04FC94B}">
-                <ma14:wrappingTextBoxFlag xmlns:ma14="http://schemas.microsoft.com/office/mac/drawingml/2011/main" xmlns:a14="http://schemas.microsoft.com/office/drawing/2010/main" xmlns:m="http://schemas.openxmlformats.org/officeDocument/2006/math" xmlns="" val="1"/>
+                <ma14:wrappingTextBoxFlag xmlns="" xmlns:m="http://schemas.openxmlformats.org/officeDocument/2006/math" xmlns:a14="http://schemas.microsoft.com/office/drawing/2010/main" xmlns:ma14="http://schemas.microsoft.com/office/mac/drawingml/2011/main" val="1"/>
               </a:ext>
             </a:extLst>
           </p:spPr>
@@ -21402,7 +21278,7 @@
             <a:effectLst/>
             <a:extLst>
               <a:ext uri="{C572A759-6A51-4108-AA02-DFA0A04FC94B}">
-                <ma14:wrappingTextBoxFlag xmlns:ma14="http://schemas.microsoft.com/office/mac/drawingml/2011/main" xmlns:a14="http://schemas.microsoft.com/office/drawing/2010/main" xmlns:m="http://schemas.openxmlformats.org/officeDocument/2006/math" xmlns="" val="1"/>
+                <ma14:wrappingTextBoxFlag xmlns="" xmlns:m="http://schemas.openxmlformats.org/officeDocument/2006/math" xmlns:a14="http://schemas.microsoft.com/office/drawing/2010/main" xmlns:ma14="http://schemas.microsoft.com/office/mac/drawingml/2011/main" val="1"/>
               </a:ext>
             </a:extLst>
           </p:spPr>
@@ -22926,7 +22802,7 @@
             <a:effectLst/>
             <a:extLst>
               <a:ext uri="{C572A759-6A51-4108-AA02-DFA0A04FC94B}">
-                <ma14:wrappingTextBoxFlag xmlns:ma14="http://schemas.microsoft.com/office/mac/drawingml/2011/main" xmlns:a14="http://schemas.microsoft.com/office/drawing/2010/main" xmlns:m="http://schemas.openxmlformats.org/officeDocument/2006/math" xmlns="" val="1"/>
+                <ma14:wrappingTextBoxFlag xmlns="" xmlns:m="http://schemas.openxmlformats.org/officeDocument/2006/math" xmlns:a14="http://schemas.microsoft.com/office/drawing/2010/main" xmlns:ma14="http://schemas.microsoft.com/office/mac/drawingml/2011/main" val="1"/>
               </a:ext>
             </a:extLst>
           </p:spPr>
@@ -22974,7 +22850,7 @@
             <a:effectLst/>
             <a:extLst>
               <a:ext uri="{C572A759-6A51-4108-AA02-DFA0A04FC94B}">
-                <ma14:wrappingTextBoxFlag xmlns:ma14="http://schemas.microsoft.com/office/mac/drawingml/2011/main" xmlns:a14="http://schemas.microsoft.com/office/drawing/2010/main" xmlns:m="http://schemas.openxmlformats.org/officeDocument/2006/math" xmlns="" val="1"/>
+                <ma14:wrappingTextBoxFlag xmlns="" xmlns:m="http://schemas.openxmlformats.org/officeDocument/2006/math" xmlns:a14="http://schemas.microsoft.com/office/drawing/2010/main" xmlns:ma14="http://schemas.microsoft.com/office/mac/drawingml/2011/main" val="1"/>
               </a:ext>
             </a:extLst>
           </p:spPr>
@@ -23132,7 +23008,7 @@
             <a:effectLst/>
             <a:extLst>
               <a:ext uri="{C572A759-6A51-4108-AA02-DFA0A04FC94B}">
-                <ma14:wrappingTextBoxFlag xmlns:ma14="http://schemas.microsoft.com/office/mac/drawingml/2011/main" xmlns:a14="http://schemas.microsoft.com/office/drawing/2010/main" xmlns:m="http://schemas.openxmlformats.org/officeDocument/2006/math" xmlns="" val="1"/>
+                <ma14:wrappingTextBoxFlag xmlns="" xmlns:m="http://schemas.openxmlformats.org/officeDocument/2006/math" xmlns:a14="http://schemas.microsoft.com/office/drawing/2010/main" xmlns:ma14="http://schemas.microsoft.com/office/mac/drawingml/2011/main" val="1"/>
               </a:ext>
             </a:extLst>
           </p:spPr>
@@ -23271,7 +23147,7 @@
             <a:effectLst/>
             <a:extLst>
               <a:ext uri="{C572A759-6A51-4108-AA02-DFA0A04FC94B}">
-                <ma14:wrappingTextBoxFlag xmlns:ma14="http://schemas.microsoft.com/office/mac/drawingml/2011/main" xmlns:a14="http://schemas.microsoft.com/office/drawing/2010/main" xmlns:m="http://schemas.openxmlformats.org/officeDocument/2006/math" xmlns="" val="1"/>
+                <ma14:wrappingTextBoxFlag xmlns="" xmlns:m="http://schemas.openxmlformats.org/officeDocument/2006/math" xmlns:a14="http://schemas.microsoft.com/office/drawing/2010/main" xmlns:ma14="http://schemas.microsoft.com/office/mac/drawingml/2011/main" val="1"/>
               </a:ext>
             </a:extLst>
           </p:spPr>
@@ -23336,7 +23212,7 @@
             <a:effectLst/>
             <a:extLst>
               <a:ext uri="{C572A759-6A51-4108-AA02-DFA0A04FC94B}">
-                <ma14:wrappingTextBoxFlag xmlns:ma14="http://schemas.microsoft.com/office/mac/drawingml/2011/main" xmlns:a14="http://schemas.microsoft.com/office/drawing/2010/main" xmlns:m="http://schemas.openxmlformats.org/officeDocument/2006/math" xmlns="" val="1"/>
+                <ma14:wrappingTextBoxFlag xmlns="" xmlns:m="http://schemas.openxmlformats.org/officeDocument/2006/math" xmlns:a14="http://schemas.microsoft.com/office/drawing/2010/main" xmlns:ma14="http://schemas.microsoft.com/office/mac/drawingml/2011/main" val="1"/>
               </a:ext>
             </a:extLst>
           </p:spPr>
@@ -23417,7 +23293,7 @@
             <a:effectLst/>
             <a:extLst>
               <a:ext uri="{C572A759-6A51-4108-AA02-DFA0A04FC94B}">
-                <ma14:wrappingTextBoxFlag xmlns:ma14="http://schemas.microsoft.com/office/mac/drawingml/2011/main" xmlns:a14="http://schemas.microsoft.com/office/drawing/2010/main" xmlns:m="http://schemas.openxmlformats.org/officeDocument/2006/math" xmlns="" val="1"/>
+                <ma14:wrappingTextBoxFlag xmlns="" xmlns:m="http://schemas.openxmlformats.org/officeDocument/2006/math" xmlns:a14="http://schemas.microsoft.com/office/drawing/2010/main" xmlns:ma14="http://schemas.microsoft.com/office/mac/drawingml/2011/main" val="1"/>
               </a:ext>
             </a:extLst>
           </p:spPr>
@@ -23465,7 +23341,7 @@
             <a:effectLst/>
             <a:extLst>
               <a:ext uri="{C572A759-6A51-4108-AA02-DFA0A04FC94B}">
-                <ma14:wrappingTextBoxFlag xmlns:ma14="http://schemas.microsoft.com/office/mac/drawingml/2011/main" xmlns:a14="http://schemas.microsoft.com/office/drawing/2010/main" xmlns:m="http://schemas.openxmlformats.org/officeDocument/2006/math" xmlns="" val="1"/>
+                <ma14:wrappingTextBoxFlag xmlns="" xmlns:m="http://schemas.openxmlformats.org/officeDocument/2006/math" xmlns:a14="http://schemas.microsoft.com/office/drawing/2010/main" xmlns:ma14="http://schemas.microsoft.com/office/mac/drawingml/2011/main" val="1"/>
               </a:ext>
             </a:extLst>
           </p:spPr>
@@ -23513,7 +23389,7 @@
             <a:effectLst/>
             <a:extLst>
               <a:ext uri="{C572A759-6A51-4108-AA02-DFA0A04FC94B}">
-                <ma14:wrappingTextBoxFlag xmlns:ma14="http://schemas.microsoft.com/office/mac/drawingml/2011/main" xmlns:a14="http://schemas.microsoft.com/office/drawing/2010/main" xmlns:m="http://schemas.openxmlformats.org/officeDocument/2006/math" xmlns="" val="1"/>
+                <ma14:wrappingTextBoxFlag xmlns="" xmlns:m="http://schemas.openxmlformats.org/officeDocument/2006/math" xmlns:a14="http://schemas.microsoft.com/office/drawing/2010/main" xmlns:ma14="http://schemas.microsoft.com/office/mac/drawingml/2011/main" val="1"/>
               </a:ext>
             </a:extLst>
           </p:spPr>
@@ -23763,7 +23639,7 @@
             <a:effectLst/>
             <a:extLst>
               <a:ext uri="{C572A759-6A51-4108-AA02-DFA0A04FC94B}">
-                <ma14:wrappingTextBoxFlag xmlns:ma14="http://schemas.microsoft.com/office/mac/drawingml/2011/main" xmlns:a14="http://schemas.microsoft.com/office/drawing/2010/main" xmlns:m="http://schemas.openxmlformats.org/officeDocument/2006/math" xmlns="" val="1"/>
+                <ma14:wrappingTextBoxFlag xmlns="" xmlns:m="http://schemas.openxmlformats.org/officeDocument/2006/math" xmlns:a14="http://schemas.microsoft.com/office/drawing/2010/main" xmlns:ma14="http://schemas.microsoft.com/office/mac/drawingml/2011/main" val="1"/>
               </a:ext>
             </a:extLst>
           </p:spPr>
@@ -23902,7 +23778,7 @@
             <a:effectLst/>
             <a:extLst>
               <a:ext uri="{C572A759-6A51-4108-AA02-DFA0A04FC94B}">
-                <ma14:wrappingTextBoxFlag xmlns:ma14="http://schemas.microsoft.com/office/mac/drawingml/2011/main" xmlns:a14="http://schemas.microsoft.com/office/drawing/2010/main" xmlns:m="http://schemas.openxmlformats.org/officeDocument/2006/math" xmlns="" val="1"/>
+                <ma14:wrappingTextBoxFlag xmlns="" xmlns:m="http://schemas.openxmlformats.org/officeDocument/2006/math" xmlns:a14="http://schemas.microsoft.com/office/drawing/2010/main" xmlns:ma14="http://schemas.microsoft.com/office/mac/drawingml/2011/main" val="1"/>
               </a:ext>
             </a:extLst>
           </p:spPr>
@@ -23967,7 +23843,7 @@
             <a:effectLst/>
             <a:extLst>
               <a:ext uri="{C572A759-6A51-4108-AA02-DFA0A04FC94B}">
-                <ma14:wrappingTextBoxFlag xmlns:ma14="http://schemas.microsoft.com/office/mac/drawingml/2011/main" xmlns:a14="http://schemas.microsoft.com/office/drawing/2010/main" xmlns:m="http://schemas.openxmlformats.org/officeDocument/2006/math" xmlns="" val="1"/>
+                <ma14:wrappingTextBoxFlag xmlns="" xmlns:m="http://schemas.openxmlformats.org/officeDocument/2006/math" xmlns:a14="http://schemas.microsoft.com/office/drawing/2010/main" xmlns:ma14="http://schemas.microsoft.com/office/mac/drawingml/2011/main" val="1"/>
               </a:ext>
             </a:extLst>
           </p:spPr>
@@ -24094,7 +23970,7 @@
             <a:effectLst/>
             <a:extLst>
               <a:ext uri="{C572A759-6A51-4108-AA02-DFA0A04FC94B}">
-                <ma14:wrappingTextBoxFlag xmlns:ma14="http://schemas.microsoft.com/office/mac/drawingml/2011/main" xmlns:a14="http://schemas.microsoft.com/office/drawing/2010/main" xmlns:m="http://schemas.openxmlformats.org/officeDocument/2006/math" xmlns="" val="1"/>
+                <ma14:wrappingTextBoxFlag xmlns="" xmlns:m="http://schemas.openxmlformats.org/officeDocument/2006/math" xmlns:a14="http://schemas.microsoft.com/office/drawing/2010/main" xmlns:ma14="http://schemas.microsoft.com/office/mac/drawingml/2011/main" val="1"/>
               </a:ext>
             </a:extLst>
           </p:spPr>
@@ -24239,7 +24115,7 @@
             <a:effectLst/>
             <a:extLst>
               <a:ext uri="{C572A759-6A51-4108-AA02-DFA0A04FC94B}">
-                <ma14:wrappingTextBoxFlag xmlns:ma14="http://schemas.microsoft.com/office/mac/drawingml/2011/main" xmlns:a14="http://schemas.microsoft.com/office/drawing/2010/main" xmlns:m="http://schemas.openxmlformats.org/officeDocument/2006/math" xmlns="" val="1"/>
+                <ma14:wrappingTextBoxFlag xmlns="" xmlns:m="http://schemas.openxmlformats.org/officeDocument/2006/math" xmlns:a14="http://schemas.microsoft.com/office/drawing/2010/main" xmlns:ma14="http://schemas.microsoft.com/office/mac/drawingml/2011/main" val="1"/>
               </a:ext>
             </a:extLst>
           </p:spPr>
@@ -24369,7 +24245,7 @@
             <a:effectLst/>
             <a:extLst>
               <a:ext uri="{C572A759-6A51-4108-AA02-DFA0A04FC94B}">
-                <ma14:wrappingTextBoxFlag xmlns:ma14="http://schemas.microsoft.com/office/mac/drawingml/2011/main" xmlns:a14="http://schemas.microsoft.com/office/drawing/2010/main" xmlns:m="http://schemas.openxmlformats.org/officeDocument/2006/math" xmlns="" val="1"/>
+                <ma14:wrappingTextBoxFlag xmlns="" xmlns:m="http://schemas.openxmlformats.org/officeDocument/2006/math" xmlns:a14="http://schemas.microsoft.com/office/drawing/2010/main" xmlns:ma14="http://schemas.microsoft.com/office/mac/drawingml/2011/main" val="1"/>
               </a:ext>
             </a:extLst>
           </p:spPr>
@@ -24516,7 +24392,7 @@
             <a:effectLst/>
             <a:extLst>
               <a:ext uri="{C572A759-6A51-4108-AA02-DFA0A04FC94B}">
-                <ma14:wrappingTextBoxFlag xmlns:ma14="http://schemas.microsoft.com/office/mac/drawingml/2011/main" xmlns:a14="http://schemas.microsoft.com/office/drawing/2010/main" xmlns:m="http://schemas.openxmlformats.org/officeDocument/2006/math" xmlns="" val="1"/>
+                <ma14:wrappingTextBoxFlag xmlns="" xmlns:m="http://schemas.openxmlformats.org/officeDocument/2006/math" xmlns:a14="http://schemas.microsoft.com/office/drawing/2010/main" xmlns:ma14="http://schemas.microsoft.com/office/mac/drawingml/2011/main" val="1"/>
               </a:ext>
             </a:extLst>
           </p:spPr>
@@ -24584,7 +24460,7 @@
             <a:effectLst/>
             <a:extLst>
               <a:ext uri="{C572A759-6A51-4108-AA02-DFA0A04FC94B}">
-                <ma14:wrappingTextBoxFlag xmlns:ma14="http://schemas.microsoft.com/office/mac/drawingml/2011/main" xmlns:a14="http://schemas.microsoft.com/office/drawing/2010/main" xmlns:m="http://schemas.openxmlformats.org/officeDocument/2006/math" xmlns="" val="1"/>
+                <ma14:wrappingTextBoxFlag xmlns="" xmlns:m="http://schemas.openxmlformats.org/officeDocument/2006/math" xmlns:a14="http://schemas.microsoft.com/office/drawing/2010/main" xmlns:ma14="http://schemas.microsoft.com/office/mac/drawingml/2011/main" val="1"/>
               </a:ext>
             </a:extLst>
           </p:spPr>
@@ -24632,7 +24508,7 @@
             <a:effectLst/>
             <a:extLst>
               <a:ext uri="{C572A759-6A51-4108-AA02-DFA0A04FC94B}">
-                <ma14:wrappingTextBoxFlag xmlns:ma14="http://schemas.microsoft.com/office/mac/drawingml/2011/main" xmlns:a14="http://schemas.microsoft.com/office/drawing/2010/main" xmlns:m="http://schemas.openxmlformats.org/officeDocument/2006/math" xmlns="" val="1"/>
+                <ma14:wrappingTextBoxFlag xmlns="" xmlns:m="http://schemas.openxmlformats.org/officeDocument/2006/math" xmlns:a14="http://schemas.microsoft.com/office/drawing/2010/main" xmlns:ma14="http://schemas.microsoft.com/office/mac/drawingml/2011/main" val="1"/>
               </a:ext>
             </a:extLst>
           </p:spPr>
@@ -24680,7 +24556,7 @@
             <a:effectLst/>
             <a:extLst>
               <a:ext uri="{C572A759-6A51-4108-AA02-DFA0A04FC94B}">
-                <ma14:wrappingTextBoxFlag xmlns:ma14="http://schemas.microsoft.com/office/mac/drawingml/2011/main" xmlns:a14="http://schemas.microsoft.com/office/drawing/2010/main" xmlns:m="http://schemas.openxmlformats.org/officeDocument/2006/math" xmlns="" val="1"/>
+                <ma14:wrappingTextBoxFlag xmlns="" xmlns:m="http://schemas.openxmlformats.org/officeDocument/2006/math" xmlns:a14="http://schemas.microsoft.com/office/drawing/2010/main" xmlns:ma14="http://schemas.microsoft.com/office/mac/drawingml/2011/main" val="1"/>
               </a:ext>
             </a:extLst>
           </p:spPr>
@@ -24728,7 +24604,7 @@
             <a:effectLst/>
             <a:extLst>
               <a:ext uri="{C572A759-6A51-4108-AA02-DFA0A04FC94B}">
-                <ma14:wrappingTextBoxFlag xmlns:ma14="http://schemas.microsoft.com/office/mac/drawingml/2011/main" xmlns:a14="http://schemas.microsoft.com/office/drawing/2010/main" xmlns:m="http://schemas.openxmlformats.org/officeDocument/2006/math" xmlns="" val="1"/>
+                <ma14:wrappingTextBoxFlag xmlns="" xmlns:m="http://schemas.openxmlformats.org/officeDocument/2006/math" xmlns:a14="http://schemas.microsoft.com/office/drawing/2010/main" xmlns:ma14="http://schemas.microsoft.com/office/mac/drawingml/2011/main" val="1"/>
               </a:ext>
             </a:extLst>
           </p:spPr>
@@ -24780,7 +24656,7 @@
             <a:effectLst/>
             <a:extLst>
               <a:ext uri="{C572A759-6A51-4108-AA02-DFA0A04FC94B}">
-                <ma14:wrappingTextBoxFlag xmlns:ma14="http://schemas.microsoft.com/office/mac/drawingml/2011/main" xmlns:a14="http://schemas.microsoft.com/office/drawing/2010/main" xmlns:m="http://schemas.openxmlformats.org/officeDocument/2006/math" xmlns="" val="1"/>
+                <ma14:wrappingTextBoxFlag xmlns="" xmlns:m="http://schemas.openxmlformats.org/officeDocument/2006/math" xmlns:a14="http://schemas.microsoft.com/office/drawing/2010/main" xmlns:ma14="http://schemas.microsoft.com/office/mac/drawingml/2011/main" val="1"/>
               </a:ext>
             </a:extLst>
           </p:spPr>
@@ -25259,7 +25135,7 @@
             <a:effectLst/>
             <a:extLst>
               <a:ext uri="{C572A759-6A51-4108-AA02-DFA0A04FC94B}">
-                <ma14:wrappingTextBoxFlag xmlns:ma14="http://schemas.microsoft.com/office/mac/drawingml/2011/main" xmlns:a14="http://schemas.microsoft.com/office/drawing/2010/main" xmlns:m="http://schemas.openxmlformats.org/officeDocument/2006/math" xmlns="" val="1"/>
+                <ma14:wrappingTextBoxFlag xmlns="" xmlns:m="http://schemas.openxmlformats.org/officeDocument/2006/math" xmlns:a14="http://schemas.microsoft.com/office/drawing/2010/main" xmlns:ma14="http://schemas.microsoft.com/office/mac/drawingml/2011/main" val="1"/>
               </a:ext>
             </a:extLst>
           </p:spPr>
@@ -25839,7 +25715,7 @@
               <a:effectLst/>
               <a:extLst>
                 <a:ext uri="{C572A759-6A51-4108-AA02-DFA0A04FC94B}">
-                  <ma14:wrappingTextBoxFlag xmlns:ma14="http://schemas.microsoft.com/office/mac/drawingml/2011/main" xmlns:a14="http://schemas.microsoft.com/office/drawing/2010/main" xmlns:m="http://schemas.openxmlformats.org/officeDocument/2006/math" xmlns="" val="1"/>
+                  <ma14:wrappingTextBoxFlag xmlns="" xmlns:m="http://schemas.openxmlformats.org/officeDocument/2006/math" xmlns:a14="http://schemas.microsoft.com/office/drawing/2010/main" xmlns:ma14="http://schemas.microsoft.com/office/mac/drawingml/2011/main" val="1"/>
                 </a:ext>
               </a:extLst>
             </p:spPr>
@@ -25883,7 +25759,7 @@
             <a:effectLst/>
             <a:extLst>
               <a:ext uri="{C572A759-6A51-4108-AA02-DFA0A04FC94B}">
-                <ma14:wrappingTextBoxFlag xmlns:ma14="http://schemas.microsoft.com/office/mac/drawingml/2011/main" xmlns:a14="http://schemas.microsoft.com/office/drawing/2010/main" xmlns:m="http://schemas.openxmlformats.org/officeDocument/2006/math" xmlns="" val="1"/>
+                <ma14:wrappingTextBoxFlag xmlns="" xmlns:m="http://schemas.openxmlformats.org/officeDocument/2006/math" xmlns:a14="http://schemas.microsoft.com/office/drawing/2010/main" xmlns:ma14="http://schemas.microsoft.com/office/mac/drawingml/2011/main" val="1"/>
               </a:ext>
             </a:extLst>
           </p:spPr>
@@ -26001,7 +25877,7 @@
               <a:effectLst/>
               <a:extLst>
                 <a:ext uri="{C572A759-6A51-4108-AA02-DFA0A04FC94B}">
-                  <ma14:wrappingTextBoxFlag xmlns:ma14="http://schemas.microsoft.com/office/mac/drawingml/2011/main" xmlns:a14="http://schemas.microsoft.com/office/drawing/2010/main" xmlns:m="http://schemas.openxmlformats.org/officeDocument/2006/math" xmlns="" val="1"/>
+                  <ma14:wrappingTextBoxFlag xmlns="" xmlns:m="http://schemas.openxmlformats.org/officeDocument/2006/math" xmlns:a14="http://schemas.microsoft.com/office/drawing/2010/main" xmlns:ma14="http://schemas.microsoft.com/office/mac/drawingml/2011/main" val="1"/>
                 </a:ext>
               </a:extLst>
             </p:spPr>
@@ -26054,7 +25930,7 @@
             <a:effectLst/>
             <a:extLst>
               <a:ext uri="{C572A759-6A51-4108-AA02-DFA0A04FC94B}">
-                <ma14:wrappingTextBoxFlag xmlns:ma14="http://schemas.microsoft.com/office/mac/drawingml/2011/main" xmlns:a14="http://schemas.microsoft.com/office/drawing/2010/main" xmlns:m="http://schemas.openxmlformats.org/officeDocument/2006/math" xmlns="" val="1"/>
+                <ma14:wrappingTextBoxFlag xmlns="" xmlns:m="http://schemas.openxmlformats.org/officeDocument/2006/math" xmlns:a14="http://schemas.microsoft.com/office/drawing/2010/main" xmlns:ma14="http://schemas.microsoft.com/office/mac/drawingml/2011/main" val="1"/>
               </a:ext>
             </a:extLst>
           </p:spPr>
@@ -26172,7 +26048,7 @@
               <a:effectLst/>
               <a:extLst>
                 <a:ext uri="{C572A759-6A51-4108-AA02-DFA0A04FC94B}">
-                  <ma14:wrappingTextBoxFlag xmlns:ma14="http://schemas.microsoft.com/office/mac/drawingml/2011/main" xmlns:a14="http://schemas.microsoft.com/office/drawing/2010/main" xmlns:m="http://schemas.openxmlformats.org/officeDocument/2006/math" xmlns="" val="1"/>
+                  <ma14:wrappingTextBoxFlag xmlns="" xmlns:m="http://schemas.openxmlformats.org/officeDocument/2006/math" xmlns:a14="http://schemas.microsoft.com/office/drawing/2010/main" xmlns:ma14="http://schemas.microsoft.com/office/mac/drawingml/2011/main" val="1"/>
                 </a:ext>
               </a:extLst>
             </p:spPr>
@@ -26220,7 +26096,7 @@
             <a:effectLst/>
             <a:extLst>
               <a:ext uri="{C572A759-6A51-4108-AA02-DFA0A04FC94B}">
-                <ma14:wrappingTextBoxFlag xmlns:ma14="http://schemas.microsoft.com/office/mac/drawingml/2011/main" xmlns:a14="http://schemas.microsoft.com/office/drawing/2010/main" xmlns:m="http://schemas.openxmlformats.org/officeDocument/2006/math" xmlns="" val="1"/>
+                <ma14:wrappingTextBoxFlag xmlns="" xmlns:m="http://schemas.openxmlformats.org/officeDocument/2006/math" xmlns:a14="http://schemas.microsoft.com/office/drawing/2010/main" xmlns:ma14="http://schemas.microsoft.com/office/mac/drawingml/2011/main" val="1"/>
               </a:ext>
             </a:extLst>
           </p:spPr>
@@ -26338,7 +26214,7 @@
               <a:effectLst/>
               <a:extLst>
                 <a:ext uri="{C572A759-6A51-4108-AA02-DFA0A04FC94B}">
-                  <ma14:wrappingTextBoxFlag xmlns:ma14="http://schemas.microsoft.com/office/mac/drawingml/2011/main" xmlns:a14="http://schemas.microsoft.com/office/drawing/2010/main" xmlns:m="http://schemas.openxmlformats.org/officeDocument/2006/math" xmlns="" val="1"/>
+                  <ma14:wrappingTextBoxFlag xmlns="" xmlns:m="http://schemas.openxmlformats.org/officeDocument/2006/math" xmlns:a14="http://schemas.microsoft.com/office/drawing/2010/main" xmlns:ma14="http://schemas.microsoft.com/office/mac/drawingml/2011/main" val="1"/>
                 </a:ext>
               </a:extLst>
             </p:spPr>
@@ -26382,7 +26258,7 @@
             <a:effectLst/>
             <a:extLst>
               <a:ext uri="{C572A759-6A51-4108-AA02-DFA0A04FC94B}">
-                <ma14:wrappingTextBoxFlag xmlns:ma14="http://schemas.microsoft.com/office/mac/drawingml/2011/main" xmlns:a14="http://schemas.microsoft.com/office/drawing/2010/main" xmlns:m="http://schemas.openxmlformats.org/officeDocument/2006/math" xmlns="" val="1"/>
+                <ma14:wrappingTextBoxFlag xmlns="" xmlns:m="http://schemas.openxmlformats.org/officeDocument/2006/math" xmlns:a14="http://schemas.microsoft.com/office/drawing/2010/main" xmlns:ma14="http://schemas.microsoft.com/office/mac/drawingml/2011/main" val="1"/>
               </a:ext>
             </a:extLst>
           </p:spPr>
@@ -26835,7 +26711,7 @@
           </a:ln>
           <a:extLst>
             <a:ext uri="{C572A759-6A51-4108-AA02-DFA0A04FC94B}">
-              <ma14:wrappingTextBoxFlag xmlns:ma14="http://schemas.microsoft.com/office/mac/drawingml/2011/main" xmlns:a14="http://schemas.microsoft.com/office/drawing/2010/main" xmlns:m="http://schemas.openxmlformats.org/officeDocument/2006/math" xmlns="" val="1"/>
+              <ma14:wrappingTextBoxFlag xmlns="" xmlns:m="http://schemas.openxmlformats.org/officeDocument/2006/math" xmlns:a14="http://schemas.microsoft.com/office/drawing/2010/main" xmlns:ma14="http://schemas.microsoft.com/office/mac/drawingml/2011/main" val="1"/>
             </a:ext>
           </a:extLst>
         </p:spPr>
@@ -26875,7 +26751,7 @@
           </a:ln>
           <a:extLst>
             <a:ext uri="{C572A759-6A51-4108-AA02-DFA0A04FC94B}">
-              <ma14:wrappingTextBoxFlag xmlns:ma14="http://schemas.microsoft.com/office/mac/drawingml/2011/main" xmlns:a14="http://schemas.microsoft.com/office/drawing/2010/main" xmlns:m="http://schemas.openxmlformats.org/officeDocument/2006/math" xmlns="" val="1"/>
+              <ma14:wrappingTextBoxFlag xmlns="" xmlns:m="http://schemas.openxmlformats.org/officeDocument/2006/math" xmlns:a14="http://schemas.microsoft.com/office/drawing/2010/main" xmlns:ma14="http://schemas.microsoft.com/office/mac/drawingml/2011/main" val="1"/>
             </a:ext>
           </a:extLst>
         </p:spPr>
@@ -26944,7 +26820,7 @@
             <a:effectLst/>
             <a:extLst>
               <a:ext uri="{C572A759-6A51-4108-AA02-DFA0A04FC94B}">
-                <ma14:wrappingTextBoxFlag xmlns:ma14="http://schemas.microsoft.com/office/mac/drawingml/2011/main" xmlns:a14="http://schemas.microsoft.com/office/drawing/2010/main" xmlns:m="http://schemas.openxmlformats.org/officeDocument/2006/math" xmlns="" val="1"/>
+                <ma14:wrappingTextBoxFlag xmlns="" xmlns:m="http://schemas.openxmlformats.org/officeDocument/2006/math" xmlns:a14="http://schemas.microsoft.com/office/drawing/2010/main" xmlns:ma14="http://schemas.microsoft.com/office/mac/drawingml/2011/main" val="1"/>
               </a:ext>
             </a:extLst>
           </p:spPr>
@@ -26998,7 +26874,7 @@
             <a:effectLst/>
             <a:extLst>
               <a:ext uri="{C572A759-6A51-4108-AA02-DFA0A04FC94B}">
-                <ma14:wrappingTextBoxFlag xmlns:ma14="http://schemas.microsoft.com/office/mac/drawingml/2011/main" xmlns:a14="http://schemas.microsoft.com/office/drawing/2010/main" xmlns:m="http://schemas.openxmlformats.org/officeDocument/2006/math" xmlns="" val="1"/>
+                <ma14:wrappingTextBoxFlag xmlns="" xmlns:m="http://schemas.openxmlformats.org/officeDocument/2006/math" xmlns:a14="http://schemas.microsoft.com/office/drawing/2010/main" xmlns:ma14="http://schemas.microsoft.com/office/mac/drawingml/2011/main" val="1"/>
               </a:ext>
             </a:extLst>
           </p:spPr>
@@ -27052,7 +26928,7 @@
             <a:effectLst/>
             <a:extLst>
               <a:ext uri="{C572A759-6A51-4108-AA02-DFA0A04FC94B}">
-                <ma14:wrappingTextBoxFlag xmlns:ma14="http://schemas.microsoft.com/office/mac/drawingml/2011/main" xmlns:a14="http://schemas.microsoft.com/office/drawing/2010/main" xmlns:m="http://schemas.openxmlformats.org/officeDocument/2006/math" xmlns="" val="1"/>
+                <ma14:wrappingTextBoxFlag xmlns="" xmlns:m="http://schemas.openxmlformats.org/officeDocument/2006/math" xmlns:a14="http://schemas.microsoft.com/office/drawing/2010/main" xmlns:ma14="http://schemas.microsoft.com/office/mac/drawingml/2011/main" val="1"/>
               </a:ext>
             </a:extLst>
           </p:spPr>
@@ -27106,7 +26982,7 @@
             <a:effectLst/>
             <a:extLst>
               <a:ext uri="{C572A759-6A51-4108-AA02-DFA0A04FC94B}">
-                <ma14:wrappingTextBoxFlag xmlns:ma14="http://schemas.microsoft.com/office/mac/drawingml/2011/main" xmlns:a14="http://schemas.microsoft.com/office/drawing/2010/main" xmlns:m="http://schemas.openxmlformats.org/officeDocument/2006/math" xmlns="" val="1"/>
+                <ma14:wrappingTextBoxFlag xmlns="" xmlns:m="http://schemas.openxmlformats.org/officeDocument/2006/math" xmlns:a14="http://schemas.microsoft.com/office/drawing/2010/main" xmlns:ma14="http://schemas.microsoft.com/office/mac/drawingml/2011/main" val="1"/>
               </a:ext>
             </a:extLst>
           </p:spPr>
@@ -27164,7 +27040,7 @@
             <a:effectLst/>
             <a:extLst>
               <a:ext uri="{C572A759-6A51-4108-AA02-DFA0A04FC94B}">
-                <ma14:wrappingTextBoxFlag xmlns:ma14="http://schemas.microsoft.com/office/mac/drawingml/2011/main" xmlns:a14="http://schemas.microsoft.com/office/drawing/2010/main" xmlns:m="http://schemas.openxmlformats.org/officeDocument/2006/math" xmlns="" val="1"/>
+                <ma14:wrappingTextBoxFlag xmlns="" xmlns:m="http://schemas.openxmlformats.org/officeDocument/2006/math" xmlns:a14="http://schemas.microsoft.com/office/drawing/2010/main" xmlns:ma14="http://schemas.microsoft.com/office/mac/drawingml/2011/main" val="1"/>
               </a:ext>
             </a:extLst>
           </p:spPr>
@@ -27218,7 +27094,7 @@
             <a:effectLst/>
             <a:extLst>
               <a:ext uri="{C572A759-6A51-4108-AA02-DFA0A04FC94B}">
-                <ma14:wrappingTextBoxFlag xmlns:ma14="http://schemas.microsoft.com/office/mac/drawingml/2011/main" xmlns:a14="http://schemas.microsoft.com/office/drawing/2010/main" xmlns:m="http://schemas.openxmlformats.org/officeDocument/2006/math" xmlns="" val="1"/>
+                <ma14:wrappingTextBoxFlag xmlns="" xmlns:m="http://schemas.openxmlformats.org/officeDocument/2006/math" xmlns:a14="http://schemas.microsoft.com/office/drawing/2010/main" xmlns:ma14="http://schemas.microsoft.com/office/mac/drawingml/2011/main" val="1"/>
               </a:ext>
             </a:extLst>
           </p:spPr>
@@ -27841,7 +27717,7 @@
             <a:effectLst/>
             <a:extLst>
               <a:ext uri="{C572A759-6A51-4108-AA02-DFA0A04FC94B}">
-                <ma14:wrappingTextBoxFlag xmlns:ma14="http://schemas.microsoft.com/office/mac/drawingml/2011/main" xmlns:a14="http://schemas.microsoft.com/office/drawing/2010/main" xmlns:m="http://schemas.openxmlformats.org/officeDocument/2006/math" xmlns="" val="1"/>
+                <ma14:wrappingTextBoxFlag xmlns="" xmlns:m="http://schemas.openxmlformats.org/officeDocument/2006/math" xmlns:a14="http://schemas.microsoft.com/office/drawing/2010/main" xmlns:ma14="http://schemas.microsoft.com/office/mac/drawingml/2011/main" val="1"/>
               </a:ext>
             </a:extLst>
           </p:spPr>
@@ -27895,7 +27771,7 @@
             <a:effectLst/>
             <a:extLst>
               <a:ext uri="{C572A759-6A51-4108-AA02-DFA0A04FC94B}">
-                <ma14:wrappingTextBoxFlag xmlns:ma14="http://schemas.microsoft.com/office/mac/drawingml/2011/main" xmlns:a14="http://schemas.microsoft.com/office/drawing/2010/main" xmlns:m="http://schemas.openxmlformats.org/officeDocument/2006/math" xmlns="" val="1"/>
+                <ma14:wrappingTextBoxFlag xmlns="" xmlns:m="http://schemas.openxmlformats.org/officeDocument/2006/math" xmlns:a14="http://schemas.microsoft.com/office/drawing/2010/main" xmlns:ma14="http://schemas.microsoft.com/office/mac/drawingml/2011/main" val="1"/>
               </a:ext>
             </a:extLst>
           </p:spPr>
@@ -27949,7 +27825,7 @@
             <a:effectLst/>
             <a:extLst>
               <a:ext uri="{C572A759-6A51-4108-AA02-DFA0A04FC94B}">
-                <ma14:wrappingTextBoxFlag xmlns:ma14="http://schemas.microsoft.com/office/mac/drawingml/2011/main" xmlns:a14="http://schemas.microsoft.com/office/drawing/2010/main" xmlns:m="http://schemas.openxmlformats.org/officeDocument/2006/math" xmlns="" val="1"/>
+                <ma14:wrappingTextBoxFlag xmlns="" xmlns:m="http://schemas.openxmlformats.org/officeDocument/2006/math" xmlns:a14="http://schemas.microsoft.com/office/drawing/2010/main" xmlns:ma14="http://schemas.microsoft.com/office/mac/drawingml/2011/main" val="1"/>
               </a:ext>
             </a:extLst>
           </p:spPr>
@@ -28003,7 +27879,7 @@
             <a:effectLst/>
             <a:extLst>
               <a:ext uri="{C572A759-6A51-4108-AA02-DFA0A04FC94B}">
-                <ma14:wrappingTextBoxFlag xmlns:ma14="http://schemas.microsoft.com/office/mac/drawingml/2011/main" xmlns:a14="http://schemas.microsoft.com/office/drawing/2010/main" xmlns:m="http://schemas.openxmlformats.org/officeDocument/2006/math" xmlns="" val="1"/>
+                <ma14:wrappingTextBoxFlag xmlns="" xmlns:m="http://schemas.openxmlformats.org/officeDocument/2006/math" xmlns:a14="http://schemas.microsoft.com/office/drawing/2010/main" xmlns:ma14="http://schemas.microsoft.com/office/mac/drawingml/2011/main" val="1"/>
               </a:ext>
             </a:extLst>
           </p:spPr>
@@ -30128,7 +30004,7 @@
             <a:effectLst/>
             <a:extLst>
               <a:ext uri="{C572A759-6A51-4108-AA02-DFA0A04FC94B}">
-                <ma14:wrappingTextBoxFlag xmlns:ma14="http://schemas.microsoft.com/office/mac/drawingml/2011/main" xmlns:a14="http://schemas.microsoft.com/office/drawing/2010/main" xmlns:m="http://schemas.openxmlformats.org/officeDocument/2006/math" xmlns="" val="1"/>
+                <ma14:wrappingTextBoxFlag xmlns="" xmlns:m="http://schemas.openxmlformats.org/officeDocument/2006/math" xmlns:a14="http://schemas.microsoft.com/office/drawing/2010/main" xmlns:ma14="http://schemas.microsoft.com/office/mac/drawingml/2011/main" val="1"/>
               </a:ext>
             </a:extLst>
           </p:spPr>
@@ -30182,7 +30058,7 @@
             <a:effectLst/>
             <a:extLst>
               <a:ext uri="{C572A759-6A51-4108-AA02-DFA0A04FC94B}">
-                <ma14:wrappingTextBoxFlag xmlns:ma14="http://schemas.microsoft.com/office/mac/drawingml/2011/main" xmlns:a14="http://schemas.microsoft.com/office/drawing/2010/main" xmlns:m="http://schemas.openxmlformats.org/officeDocument/2006/math" xmlns="" val="1"/>
+                <ma14:wrappingTextBoxFlag xmlns="" xmlns:m="http://schemas.openxmlformats.org/officeDocument/2006/math" xmlns:a14="http://schemas.microsoft.com/office/drawing/2010/main" xmlns:ma14="http://schemas.microsoft.com/office/mac/drawingml/2011/main" val="1"/>
               </a:ext>
             </a:extLst>
           </p:spPr>
@@ -30236,7 +30112,7 @@
             <a:effectLst/>
             <a:extLst>
               <a:ext uri="{C572A759-6A51-4108-AA02-DFA0A04FC94B}">
-                <ma14:wrappingTextBoxFlag xmlns:ma14="http://schemas.microsoft.com/office/mac/drawingml/2011/main" xmlns:a14="http://schemas.microsoft.com/office/drawing/2010/main" xmlns:m="http://schemas.openxmlformats.org/officeDocument/2006/math" xmlns="" val="1"/>
+                <ma14:wrappingTextBoxFlag xmlns="" xmlns:m="http://schemas.openxmlformats.org/officeDocument/2006/math" xmlns:a14="http://schemas.microsoft.com/office/drawing/2010/main" xmlns:ma14="http://schemas.microsoft.com/office/mac/drawingml/2011/main" val="1"/>
               </a:ext>
             </a:extLst>
           </p:spPr>
@@ -30290,7 +30166,7 @@
             <a:effectLst/>
             <a:extLst>
               <a:ext uri="{C572A759-6A51-4108-AA02-DFA0A04FC94B}">
-                <ma14:wrappingTextBoxFlag xmlns:ma14="http://schemas.microsoft.com/office/mac/drawingml/2011/main" xmlns:a14="http://schemas.microsoft.com/office/drawing/2010/main" xmlns:m="http://schemas.openxmlformats.org/officeDocument/2006/math" xmlns="" val="1"/>
+                <ma14:wrappingTextBoxFlag xmlns="" xmlns:m="http://schemas.openxmlformats.org/officeDocument/2006/math" xmlns:a14="http://schemas.microsoft.com/office/drawing/2010/main" xmlns:ma14="http://schemas.microsoft.com/office/mac/drawingml/2011/main" val="1"/>
               </a:ext>
             </a:extLst>
           </p:spPr>
@@ -30348,7 +30224,7 @@
             <a:effectLst/>
             <a:extLst>
               <a:ext uri="{C572A759-6A51-4108-AA02-DFA0A04FC94B}">
-                <ma14:wrappingTextBoxFlag xmlns:ma14="http://schemas.microsoft.com/office/mac/drawingml/2011/main" xmlns:a14="http://schemas.microsoft.com/office/drawing/2010/main" xmlns:m="http://schemas.openxmlformats.org/officeDocument/2006/math" xmlns="" val="1"/>
+                <ma14:wrappingTextBoxFlag xmlns="" xmlns:m="http://schemas.openxmlformats.org/officeDocument/2006/math" xmlns:a14="http://schemas.microsoft.com/office/drawing/2010/main" xmlns:ma14="http://schemas.microsoft.com/office/mac/drawingml/2011/main" val="1"/>
               </a:ext>
             </a:extLst>
           </p:spPr>
@@ -30831,7 +30707,7 @@
             <a:effectLst/>
             <a:extLst>
               <a:ext uri="{C572A759-6A51-4108-AA02-DFA0A04FC94B}">
-                <ma14:wrappingTextBoxFlag xmlns:ma14="http://schemas.microsoft.com/office/mac/drawingml/2011/main" xmlns:a14="http://schemas.microsoft.com/office/drawing/2010/main" xmlns:m="http://schemas.openxmlformats.org/officeDocument/2006/math" xmlns="" val="1"/>
+                <ma14:wrappingTextBoxFlag xmlns="" xmlns:m="http://schemas.openxmlformats.org/officeDocument/2006/math" xmlns:a14="http://schemas.microsoft.com/office/drawing/2010/main" xmlns:ma14="http://schemas.microsoft.com/office/mac/drawingml/2011/main" val="1"/>
               </a:ext>
             </a:extLst>
           </p:spPr>
@@ -30885,7 +30761,7 @@
             <a:effectLst/>
             <a:extLst>
               <a:ext uri="{C572A759-6A51-4108-AA02-DFA0A04FC94B}">
-                <ma14:wrappingTextBoxFlag xmlns:ma14="http://schemas.microsoft.com/office/mac/drawingml/2011/main" xmlns:a14="http://schemas.microsoft.com/office/drawing/2010/main" xmlns:m="http://schemas.openxmlformats.org/officeDocument/2006/math" xmlns="" val="1"/>
+                <ma14:wrappingTextBoxFlag xmlns="" xmlns:m="http://schemas.openxmlformats.org/officeDocument/2006/math" xmlns:a14="http://schemas.microsoft.com/office/drawing/2010/main" xmlns:ma14="http://schemas.microsoft.com/office/mac/drawingml/2011/main" val="1"/>
               </a:ext>
             </a:extLst>
           </p:spPr>
@@ -30939,7 +30815,7 @@
             <a:effectLst/>
             <a:extLst>
               <a:ext uri="{C572A759-6A51-4108-AA02-DFA0A04FC94B}">
-                <ma14:wrappingTextBoxFlag xmlns:ma14="http://schemas.microsoft.com/office/mac/drawingml/2011/main" xmlns:a14="http://schemas.microsoft.com/office/drawing/2010/main" xmlns:m="http://schemas.openxmlformats.org/officeDocument/2006/math" xmlns="" val="1"/>
+                <ma14:wrappingTextBoxFlag xmlns="" xmlns:m="http://schemas.openxmlformats.org/officeDocument/2006/math" xmlns:a14="http://schemas.microsoft.com/office/drawing/2010/main" xmlns:ma14="http://schemas.microsoft.com/office/mac/drawingml/2011/main" val="1"/>
               </a:ext>
             </a:extLst>
           </p:spPr>
@@ -30993,7 +30869,7 @@
             <a:effectLst/>
             <a:extLst>
               <a:ext uri="{C572A759-6A51-4108-AA02-DFA0A04FC94B}">
-                <ma14:wrappingTextBoxFlag xmlns:ma14="http://schemas.microsoft.com/office/mac/drawingml/2011/main" xmlns:a14="http://schemas.microsoft.com/office/drawing/2010/main" xmlns:m="http://schemas.openxmlformats.org/officeDocument/2006/math" xmlns="" val="1"/>
+                <ma14:wrappingTextBoxFlag xmlns="" xmlns:m="http://schemas.openxmlformats.org/officeDocument/2006/math" xmlns:a14="http://schemas.microsoft.com/office/drawing/2010/main" xmlns:ma14="http://schemas.microsoft.com/office/mac/drawingml/2011/main" val="1"/>
               </a:ext>
             </a:extLst>
           </p:spPr>
@@ -31051,7 +30927,7 @@
             <a:effectLst/>
             <a:extLst>
               <a:ext uri="{C572A759-6A51-4108-AA02-DFA0A04FC94B}">
-                <ma14:wrappingTextBoxFlag xmlns:ma14="http://schemas.microsoft.com/office/mac/drawingml/2011/main" xmlns:a14="http://schemas.microsoft.com/office/drawing/2010/main" xmlns:m="http://schemas.openxmlformats.org/officeDocument/2006/math" xmlns="" val="1"/>
+                <ma14:wrappingTextBoxFlag xmlns="" xmlns:m="http://schemas.openxmlformats.org/officeDocument/2006/math" xmlns:a14="http://schemas.microsoft.com/office/drawing/2010/main" xmlns:ma14="http://schemas.microsoft.com/office/mac/drawingml/2011/main" val="1"/>
               </a:ext>
             </a:extLst>
           </p:spPr>
@@ -31105,7 +30981,7 @@
             <a:effectLst/>
             <a:extLst>
               <a:ext uri="{C572A759-6A51-4108-AA02-DFA0A04FC94B}">
-                <ma14:wrappingTextBoxFlag xmlns:ma14="http://schemas.microsoft.com/office/mac/drawingml/2011/main" xmlns:a14="http://schemas.microsoft.com/office/drawing/2010/main" xmlns:m="http://schemas.openxmlformats.org/officeDocument/2006/math" xmlns="" val="1"/>
+                <ma14:wrappingTextBoxFlag xmlns="" xmlns:m="http://schemas.openxmlformats.org/officeDocument/2006/math" xmlns:a14="http://schemas.microsoft.com/office/drawing/2010/main" xmlns:ma14="http://schemas.microsoft.com/office/mac/drawingml/2011/main" val="1"/>
               </a:ext>
             </a:extLst>
           </p:spPr>
@@ -34707,7 +34583,7 @@
               <a:effectLst/>
               <a:extLst>
                 <a:ext uri="{C572A759-6A51-4108-AA02-DFA0A04FC94B}">
-                  <ma14:wrappingTextBoxFlag xmlns:ma14="http://schemas.microsoft.com/office/mac/drawingml/2011/main" xmlns:a14="http://schemas.microsoft.com/office/drawing/2010/main" xmlns:m="http://schemas.openxmlformats.org/officeDocument/2006/math" xmlns="" val="1"/>
+                  <ma14:wrappingTextBoxFlag xmlns="" xmlns:m="http://schemas.openxmlformats.org/officeDocument/2006/math" xmlns:a14="http://schemas.microsoft.com/office/drawing/2010/main" xmlns:ma14="http://schemas.microsoft.com/office/mac/drawingml/2011/main" val="1"/>
                 </a:ext>
               </a:extLst>
             </p:spPr>
@@ -35598,7 +35474,7 @@
             <a:effectLst/>
             <a:extLst>
               <a:ext uri="{C572A759-6A51-4108-AA02-DFA0A04FC94B}">
-                <ma14:wrappingTextBoxFlag xmlns:ma14="http://schemas.microsoft.com/office/mac/drawingml/2011/main" xmlns:a14="http://schemas.microsoft.com/office/drawing/2010/main" xmlns:m="http://schemas.openxmlformats.org/officeDocument/2006/math" xmlns="" val="1"/>
+                <ma14:wrappingTextBoxFlag xmlns="" xmlns:m="http://schemas.openxmlformats.org/officeDocument/2006/math" xmlns:a14="http://schemas.microsoft.com/office/drawing/2010/main" xmlns:ma14="http://schemas.microsoft.com/office/mac/drawingml/2011/main" val="1"/>
               </a:ext>
             </a:extLst>
           </p:spPr>
@@ -37037,7 +36913,7 @@
               <a:effectLst/>
               <a:extLst>
                 <a:ext uri="{C572A759-6A51-4108-AA02-DFA0A04FC94B}">
-                  <ma14:wrappingTextBoxFlag xmlns:ma14="http://schemas.microsoft.com/office/mac/drawingml/2011/main" xmlns:a14="http://schemas.microsoft.com/office/drawing/2010/main" xmlns:m="http://schemas.openxmlformats.org/officeDocument/2006/math" xmlns="" val="1"/>
+                  <ma14:wrappingTextBoxFlag xmlns="" xmlns:m="http://schemas.openxmlformats.org/officeDocument/2006/math" xmlns:a14="http://schemas.microsoft.com/office/drawing/2010/main" xmlns:ma14="http://schemas.microsoft.com/office/mac/drawingml/2011/main" val="1"/>
                 </a:ext>
               </a:extLst>
             </p:spPr>
@@ -37085,7 +36961,7 @@
               <a:effectLst/>
               <a:extLst>
                 <a:ext uri="{C572A759-6A51-4108-AA02-DFA0A04FC94B}">
-                  <ma14:wrappingTextBoxFlag xmlns:ma14="http://schemas.microsoft.com/office/mac/drawingml/2011/main" xmlns:a14="http://schemas.microsoft.com/office/drawing/2010/main" xmlns:m="http://schemas.openxmlformats.org/officeDocument/2006/math" xmlns="" val="1"/>
+                  <ma14:wrappingTextBoxFlag xmlns="" xmlns:m="http://schemas.openxmlformats.org/officeDocument/2006/math" xmlns:a14="http://schemas.microsoft.com/office/drawing/2010/main" xmlns:ma14="http://schemas.microsoft.com/office/mac/drawingml/2011/main" val="1"/>
                 </a:ext>
               </a:extLst>
             </p:spPr>
@@ -37243,7 +37119,7 @@
               <a:effectLst/>
               <a:extLst>
                 <a:ext uri="{C572A759-6A51-4108-AA02-DFA0A04FC94B}">
-                  <ma14:wrappingTextBoxFlag xmlns:ma14="http://schemas.microsoft.com/office/mac/drawingml/2011/main" xmlns:a14="http://schemas.microsoft.com/office/drawing/2010/main" xmlns:m="http://schemas.openxmlformats.org/officeDocument/2006/math" xmlns="" val="1"/>
+                  <ma14:wrappingTextBoxFlag xmlns="" xmlns:m="http://schemas.openxmlformats.org/officeDocument/2006/math" xmlns:a14="http://schemas.microsoft.com/office/drawing/2010/main" xmlns:ma14="http://schemas.microsoft.com/office/mac/drawingml/2011/main" val="1"/>
                 </a:ext>
               </a:extLst>
             </p:spPr>
@@ -37382,7 +37258,7 @@
               <a:effectLst/>
               <a:extLst>
                 <a:ext uri="{C572A759-6A51-4108-AA02-DFA0A04FC94B}">
-                  <ma14:wrappingTextBoxFlag xmlns:ma14="http://schemas.microsoft.com/office/mac/drawingml/2011/main" xmlns:a14="http://schemas.microsoft.com/office/drawing/2010/main" xmlns:m="http://schemas.openxmlformats.org/officeDocument/2006/math" xmlns="" val="1"/>
+                  <ma14:wrappingTextBoxFlag xmlns="" xmlns:m="http://schemas.openxmlformats.org/officeDocument/2006/math" xmlns:a14="http://schemas.microsoft.com/office/drawing/2010/main" xmlns:ma14="http://schemas.microsoft.com/office/mac/drawingml/2011/main" val="1"/>
                 </a:ext>
               </a:extLst>
             </p:spPr>
@@ -37439,7 +37315,7 @@
               <a:effectLst/>
               <a:extLst>
                 <a:ext uri="{C572A759-6A51-4108-AA02-DFA0A04FC94B}">
-                  <ma14:wrappingTextBoxFlag xmlns:ma14="http://schemas.microsoft.com/office/mac/drawingml/2011/main" xmlns:a14="http://schemas.microsoft.com/office/drawing/2010/main" xmlns:m="http://schemas.openxmlformats.org/officeDocument/2006/math" xmlns="" val="1"/>
+                  <ma14:wrappingTextBoxFlag xmlns="" xmlns:m="http://schemas.openxmlformats.org/officeDocument/2006/math" xmlns:a14="http://schemas.microsoft.com/office/drawing/2010/main" xmlns:ma14="http://schemas.microsoft.com/office/mac/drawingml/2011/main" val="1"/>
                 </a:ext>
               </a:extLst>
             </p:spPr>
@@ -37520,7 +37396,7 @@
               <a:effectLst/>
               <a:extLst>
                 <a:ext uri="{C572A759-6A51-4108-AA02-DFA0A04FC94B}">
-                  <ma14:wrappingTextBoxFlag xmlns:ma14="http://schemas.microsoft.com/office/mac/drawingml/2011/main" xmlns:a14="http://schemas.microsoft.com/office/drawing/2010/main" xmlns:m="http://schemas.openxmlformats.org/officeDocument/2006/math" xmlns="" val="1"/>
+                  <ma14:wrappingTextBoxFlag xmlns="" xmlns:m="http://schemas.openxmlformats.org/officeDocument/2006/math" xmlns:a14="http://schemas.microsoft.com/office/drawing/2010/main" xmlns:ma14="http://schemas.microsoft.com/office/mac/drawingml/2011/main" val="1"/>
                 </a:ext>
               </a:extLst>
             </p:spPr>
@@ -37568,7 +37444,7 @@
               <a:effectLst/>
               <a:extLst>
                 <a:ext uri="{C572A759-6A51-4108-AA02-DFA0A04FC94B}">
-                  <ma14:wrappingTextBoxFlag xmlns:ma14="http://schemas.microsoft.com/office/mac/drawingml/2011/main" xmlns:a14="http://schemas.microsoft.com/office/drawing/2010/main" xmlns:m="http://schemas.openxmlformats.org/officeDocument/2006/math" xmlns="" val="1"/>
+                  <ma14:wrappingTextBoxFlag xmlns="" xmlns:m="http://schemas.openxmlformats.org/officeDocument/2006/math" xmlns:a14="http://schemas.microsoft.com/office/drawing/2010/main" xmlns:ma14="http://schemas.microsoft.com/office/mac/drawingml/2011/main" val="1"/>
                 </a:ext>
               </a:extLst>
             </p:spPr>
@@ -37616,7 +37492,7 @@
               <a:effectLst/>
               <a:extLst>
                 <a:ext uri="{C572A759-6A51-4108-AA02-DFA0A04FC94B}">
-                  <ma14:wrappingTextBoxFlag xmlns:ma14="http://schemas.microsoft.com/office/mac/drawingml/2011/main" xmlns:a14="http://schemas.microsoft.com/office/drawing/2010/main" xmlns:m="http://schemas.openxmlformats.org/officeDocument/2006/math" xmlns="" val="1"/>
+                  <ma14:wrappingTextBoxFlag xmlns="" xmlns:m="http://schemas.openxmlformats.org/officeDocument/2006/math" xmlns:a14="http://schemas.microsoft.com/office/drawing/2010/main" xmlns:ma14="http://schemas.microsoft.com/office/mac/drawingml/2011/main" val="1"/>
                 </a:ext>
               </a:extLst>
             </p:spPr>
@@ -37866,7 +37742,7 @@
               <a:effectLst/>
               <a:extLst>
                 <a:ext uri="{C572A759-6A51-4108-AA02-DFA0A04FC94B}">
-                  <ma14:wrappingTextBoxFlag xmlns:ma14="http://schemas.microsoft.com/office/mac/drawingml/2011/main" xmlns:a14="http://schemas.microsoft.com/office/drawing/2010/main" xmlns:m="http://schemas.openxmlformats.org/officeDocument/2006/math" xmlns="" val="1"/>
+                  <ma14:wrappingTextBoxFlag xmlns="" xmlns:m="http://schemas.openxmlformats.org/officeDocument/2006/math" xmlns:a14="http://schemas.microsoft.com/office/drawing/2010/main" xmlns:ma14="http://schemas.microsoft.com/office/mac/drawingml/2011/main" val="1"/>
                 </a:ext>
               </a:extLst>
             </p:spPr>
@@ -38005,7 +37881,7 @@
               <a:effectLst/>
               <a:extLst>
                 <a:ext uri="{C572A759-6A51-4108-AA02-DFA0A04FC94B}">
-                  <ma14:wrappingTextBoxFlag xmlns:ma14="http://schemas.microsoft.com/office/mac/drawingml/2011/main" xmlns:a14="http://schemas.microsoft.com/office/drawing/2010/main" xmlns:m="http://schemas.openxmlformats.org/officeDocument/2006/math" xmlns="" val="1"/>
+                  <ma14:wrappingTextBoxFlag xmlns="" xmlns:m="http://schemas.openxmlformats.org/officeDocument/2006/math" xmlns:a14="http://schemas.microsoft.com/office/drawing/2010/main" xmlns:ma14="http://schemas.microsoft.com/office/mac/drawingml/2011/main" val="1"/>
                 </a:ext>
               </a:extLst>
             </p:spPr>
@@ -38070,7 +37946,7 @@
               <a:effectLst/>
               <a:extLst>
                 <a:ext uri="{C572A759-6A51-4108-AA02-DFA0A04FC94B}">
-                  <ma14:wrappingTextBoxFlag xmlns:ma14="http://schemas.microsoft.com/office/mac/drawingml/2011/main" xmlns:a14="http://schemas.microsoft.com/office/drawing/2010/main" xmlns:m="http://schemas.openxmlformats.org/officeDocument/2006/math" xmlns="" val="1"/>
+                  <ma14:wrappingTextBoxFlag xmlns="" xmlns:m="http://schemas.openxmlformats.org/officeDocument/2006/math" xmlns:a14="http://schemas.microsoft.com/office/drawing/2010/main" xmlns:ma14="http://schemas.microsoft.com/office/mac/drawingml/2011/main" val="1"/>
                 </a:ext>
               </a:extLst>
             </p:spPr>
@@ -38197,7 +38073,7 @@
               <a:effectLst/>
               <a:extLst>
                 <a:ext uri="{C572A759-6A51-4108-AA02-DFA0A04FC94B}">
-                  <ma14:wrappingTextBoxFlag xmlns:ma14="http://schemas.microsoft.com/office/mac/drawingml/2011/main" xmlns:a14="http://schemas.microsoft.com/office/drawing/2010/main" xmlns:m="http://schemas.openxmlformats.org/officeDocument/2006/math" xmlns="" val="1"/>
+                  <ma14:wrappingTextBoxFlag xmlns="" xmlns:m="http://schemas.openxmlformats.org/officeDocument/2006/math" xmlns:a14="http://schemas.microsoft.com/office/drawing/2010/main" xmlns:ma14="http://schemas.microsoft.com/office/mac/drawingml/2011/main" val="1"/>
                 </a:ext>
               </a:extLst>
             </p:spPr>
@@ -38348,7 +38224,7 @@
               <a:effectLst/>
               <a:extLst>
                 <a:ext uri="{C572A759-6A51-4108-AA02-DFA0A04FC94B}">
-                  <ma14:wrappingTextBoxFlag xmlns:ma14="http://schemas.microsoft.com/office/mac/drawingml/2011/main" xmlns:a14="http://schemas.microsoft.com/office/drawing/2010/main" xmlns:m="http://schemas.openxmlformats.org/officeDocument/2006/math" xmlns="" val="1"/>
+                  <ma14:wrappingTextBoxFlag xmlns="" xmlns:m="http://schemas.openxmlformats.org/officeDocument/2006/math" xmlns:a14="http://schemas.microsoft.com/office/drawing/2010/main" xmlns:ma14="http://schemas.microsoft.com/office/mac/drawingml/2011/main" val="1"/>
                 </a:ext>
               </a:extLst>
             </p:spPr>
@@ -38414,7 +38290,7 @@
             <a:effectLst/>
             <a:extLst>
               <a:ext uri="{C572A759-6A51-4108-AA02-DFA0A04FC94B}">
-                <ma14:wrappingTextBoxFlag xmlns:ma14="http://schemas.microsoft.com/office/mac/drawingml/2011/main" xmlns:a14="http://schemas.microsoft.com/office/drawing/2010/main" xmlns:m="http://schemas.openxmlformats.org/officeDocument/2006/math" xmlns="" val="1"/>
+                <ma14:wrappingTextBoxFlag xmlns="" xmlns:m="http://schemas.openxmlformats.org/officeDocument/2006/math" xmlns:a14="http://schemas.microsoft.com/office/drawing/2010/main" xmlns:ma14="http://schemas.microsoft.com/office/mac/drawingml/2011/main" val="1"/>
               </a:ext>
             </a:extLst>
           </p:spPr>
@@ -38526,7 +38402,7 @@
               <a:effectLst/>
               <a:extLst>
                 <a:ext uri="{C572A759-6A51-4108-AA02-DFA0A04FC94B}">
-                  <ma14:wrappingTextBoxFlag xmlns:ma14="http://schemas.microsoft.com/office/mac/drawingml/2011/main" xmlns:a14="http://schemas.microsoft.com/office/drawing/2010/main" xmlns:m="http://schemas.openxmlformats.org/officeDocument/2006/math" xmlns="" val="1"/>
+                  <ma14:wrappingTextBoxFlag xmlns="" xmlns:m="http://schemas.openxmlformats.org/officeDocument/2006/math" xmlns:a14="http://schemas.microsoft.com/office/drawing/2010/main" xmlns:ma14="http://schemas.microsoft.com/office/mac/drawingml/2011/main" val="1"/>
                 </a:ext>
               </a:extLst>
             </p:spPr>
@@ -38673,7 +38549,7 @@
               <a:effectLst/>
               <a:extLst>
                 <a:ext uri="{C572A759-6A51-4108-AA02-DFA0A04FC94B}">
-                  <ma14:wrappingTextBoxFlag xmlns:ma14="http://schemas.microsoft.com/office/mac/drawingml/2011/main" xmlns:a14="http://schemas.microsoft.com/office/drawing/2010/main" xmlns:m="http://schemas.openxmlformats.org/officeDocument/2006/math" xmlns="" val="1"/>
+                  <ma14:wrappingTextBoxFlag xmlns="" xmlns:m="http://schemas.openxmlformats.org/officeDocument/2006/math" xmlns:a14="http://schemas.microsoft.com/office/drawing/2010/main" xmlns:ma14="http://schemas.microsoft.com/office/mac/drawingml/2011/main" val="1"/>
                 </a:ext>
               </a:extLst>
             </p:spPr>
@@ -38741,7 +38617,7 @@
               <a:effectLst/>
               <a:extLst>
                 <a:ext uri="{C572A759-6A51-4108-AA02-DFA0A04FC94B}">
-                  <ma14:wrappingTextBoxFlag xmlns:ma14="http://schemas.microsoft.com/office/mac/drawingml/2011/main" xmlns:a14="http://schemas.microsoft.com/office/drawing/2010/main" xmlns:m="http://schemas.openxmlformats.org/officeDocument/2006/math" xmlns="" val="1"/>
+                  <ma14:wrappingTextBoxFlag xmlns="" xmlns:m="http://schemas.openxmlformats.org/officeDocument/2006/math" xmlns:a14="http://schemas.microsoft.com/office/drawing/2010/main" xmlns:ma14="http://schemas.microsoft.com/office/mac/drawingml/2011/main" val="1"/>
                 </a:ext>
               </a:extLst>
             </p:spPr>
@@ -38789,7 +38665,7 @@
               <a:effectLst/>
               <a:extLst>
                 <a:ext uri="{C572A759-6A51-4108-AA02-DFA0A04FC94B}">
-                  <ma14:wrappingTextBoxFlag xmlns:ma14="http://schemas.microsoft.com/office/mac/drawingml/2011/main" xmlns:a14="http://schemas.microsoft.com/office/drawing/2010/main" xmlns:m="http://schemas.openxmlformats.org/officeDocument/2006/math" xmlns="" val="1"/>
+                  <ma14:wrappingTextBoxFlag xmlns="" xmlns:m="http://schemas.openxmlformats.org/officeDocument/2006/math" xmlns:a14="http://schemas.microsoft.com/office/drawing/2010/main" xmlns:ma14="http://schemas.microsoft.com/office/mac/drawingml/2011/main" val="1"/>
                 </a:ext>
               </a:extLst>
             </p:spPr>
@@ -38837,7 +38713,7 @@
               <a:effectLst/>
               <a:extLst>
                 <a:ext uri="{C572A759-6A51-4108-AA02-DFA0A04FC94B}">
-                  <ma14:wrappingTextBoxFlag xmlns:ma14="http://schemas.microsoft.com/office/mac/drawingml/2011/main" xmlns:a14="http://schemas.microsoft.com/office/drawing/2010/main" xmlns:m="http://schemas.openxmlformats.org/officeDocument/2006/math" xmlns="" val="1"/>
+                  <ma14:wrappingTextBoxFlag xmlns="" xmlns:m="http://schemas.openxmlformats.org/officeDocument/2006/math" xmlns:a14="http://schemas.microsoft.com/office/drawing/2010/main" xmlns:ma14="http://schemas.microsoft.com/office/mac/drawingml/2011/main" val="1"/>
                 </a:ext>
               </a:extLst>
             </p:spPr>
@@ -38885,7 +38761,7 @@
               <a:effectLst/>
               <a:extLst>
                 <a:ext uri="{C572A759-6A51-4108-AA02-DFA0A04FC94B}">
-                  <ma14:wrappingTextBoxFlag xmlns:ma14="http://schemas.microsoft.com/office/mac/drawingml/2011/main" xmlns:a14="http://schemas.microsoft.com/office/drawing/2010/main" xmlns:m="http://schemas.openxmlformats.org/officeDocument/2006/math" xmlns="" val="1"/>
+                  <ma14:wrappingTextBoxFlag xmlns="" xmlns:m="http://schemas.openxmlformats.org/officeDocument/2006/math" xmlns:a14="http://schemas.microsoft.com/office/drawing/2010/main" xmlns:ma14="http://schemas.microsoft.com/office/mac/drawingml/2011/main" val="1"/>
                 </a:ext>
               </a:extLst>
             </p:spPr>
@@ -38937,7 +38813,7 @@
               <a:effectLst/>
               <a:extLst>
                 <a:ext uri="{C572A759-6A51-4108-AA02-DFA0A04FC94B}">
-                  <ma14:wrappingTextBoxFlag xmlns:ma14="http://schemas.microsoft.com/office/mac/drawingml/2011/main" xmlns:a14="http://schemas.microsoft.com/office/drawing/2010/main" xmlns:m="http://schemas.openxmlformats.org/officeDocument/2006/math" xmlns="" val="1"/>
+                  <ma14:wrappingTextBoxFlag xmlns="" xmlns:m="http://schemas.openxmlformats.org/officeDocument/2006/math" xmlns:a14="http://schemas.microsoft.com/office/drawing/2010/main" xmlns:ma14="http://schemas.microsoft.com/office/mac/drawingml/2011/main" val="1"/>
                 </a:ext>
               </a:extLst>
             </p:spPr>
@@ -38985,7 +38861,7 @@
               <a:effectLst/>
               <a:extLst>
                 <a:ext uri="{C572A759-6A51-4108-AA02-DFA0A04FC94B}">
-                  <ma14:wrappingTextBoxFlag xmlns:ma14="http://schemas.microsoft.com/office/mac/drawingml/2011/main" xmlns:a14="http://schemas.microsoft.com/office/drawing/2010/main" xmlns:m="http://schemas.openxmlformats.org/officeDocument/2006/math" xmlns="" val="1"/>
+                  <ma14:wrappingTextBoxFlag xmlns="" xmlns:m="http://schemas.openxmlformats.org/officeDocument/2006/math" xmlns:a14="http://schemas.microsoft.com/office/drawing/2010/main" xmlns:ma14="http://schemas.microsoft.com/office/mac/drawingml/2011/main" val="1"/>
                 </a:ext>
               </a:extLst>
             </p:spPr>
@@ -39592,7 +39468,7 @@
               <a:effectLst/>
               <a:extLst>
                 <a:ext uri="{C572A759-6A51-4108-AA02-DFA0A04FC94B}">
-                  <ma14:wrappingTextBoxFlag xmlns:ma14="http://schemas.microsoft.com/office/mac/drawingml/2011/main" xmlns:a14="http://schemas.microsoft.com/office/drawing/2010/main" xmlns:m="http://schemas.openxmlformats.org/officeDocument/2006/math" xmlns="" val="1"/>
+                  <ma14:wrappingTextBoxFlag xmlns="" xmlns:m="http://schemas.openxmlformats.org/officeDocument/2006/math" xmlns:a14="http://schemas.microsoft.com/office/drawing/2010/main" xmlns:ma14="http://schemas.microsoft.com/office/mac/drawingml/2011/main" val="1"/>
                 </a:ext>
               </a:extLst>
             </p:spPr>
@@ -40197,7 +40073,7 @@
                 <a:effectLst/>
                 <a:extLst>
                   <a:ext uri="{C572A759-6A51-4108-AA02-DFA0A04FC94B}">
-                    <ma14:wrappingTextBoxFlag xmlns:ma14="http://schemas.microsoft.com/office/mac/drawingml/2011/main" xmlns:a14="http://schemas.microsoft.com/office/drawing/2010/main" xmlns:m="http://schemas.openxmlformats.org/officeDocument/2006/math" xmlns="" val="1"/>
+                    <ma14:wrappingTextBoxFlag xmlns="" xmlns:m="http://schemas.openxmlformats.org/officeDocument/2006/math" xmlns:a14="http://schemas.microsoft.com/office/drawing/2010/main" xmlns:ma14="http://schemas.microsoft.com/office/mac/drawingml/2011/main" val="1"/>
                   </a:ext>
                 </a:extLst>
               </p:spPr>
@@ -40241,7 +40117,7 @@
               <a:effectLst/>
               <a:extLst>
                 <a:ext uri="{C572A759-6A51-4108-AA02-DFA0A04FC94B}">
-                  <ma14:wrappingTextBoxFlag xmlns:ma14="http://schemas.microsoft.com/office/mac/drawingml/2011/main" xmlns:a14="http://schemas.microsoft.com/office/drawing/2010/main" xmlns:m="http://schemas.openxmlformats.org/officeDocument/2006/math" xmlns="" val="1"/>
+                  <ma14:wrappingTextBoxFlag xmlns="" xmlns:m="http://schemas.openxmlformats.org/officeDocument/2006/math" xmlns:a14="http://schemas.microsoft.com/office/drawing/2010/main" xmlns:ma14="http://schemas.microsoft.com/office/mac/drawingml/2011/main" val="1"/>
                 </a:ext>
               </a:extLst>
             </p:spPr>
@@ -40482,7 +40358,7 @@
                 <a:effectLst/>
                 <a:extLst>
                   <a:ext uri="{C572A759-6A51-4108-AA02-DFA0A04FC94B}">
-                    <ma14:wrappingTextBoxFlag xmlns:ma14="http://schemas.microsoft.com/office/mac/drawingml/2011/main" xmlns:a14="http://schemas.microsoft.com/office/drawing/2010/main" xmlns:m="http://schemas.openxmlformats.org/officeDocument/2006/math" xmlns="" val="1"/>
+                    <ma14:wrappingTextBoxFlag xmlns="" xmlns:m="http://schemas.openxmlformats.org/officeDocument/2006/math" xmlns:a14="http://schemas.microsoft.com/office/drawing/2010/main" xmlns:ma14="http://schemas.microsoft.com/office/mac/drawingml/2011/main" val="1"/>
                   </a:ext>
                 </a:extLst>
               </p:spPr>
@@ -40535,7 +40411,7 @@
               <a:effectLst/>
               <a:extLst>
                 <a:ext uri="{C572A759-6A51-4108-AA02-DFA0A04FC94B}">
-                  <ma14:wrappingTextBoxFlag xmlns:ma14="http://schemas.microsoft.com/office/mac/drawingml/2011/main" xmlns:a14="http://schemas.microsoft.com/office/drawing/2010/main" xmlns:m="http://schemas.openxmlformats.org/officeDocument/2006/math" xmlns="" val="1"/>
+                  <ma14:wrappingTextBoxFlag xmlns="" xmlns:m="http://schemas.openxmlformats.org/officeDocument/2006/math" xmlns:a14="http://schemas.microsoft.com/office/drawing/2010/main" xmlns:ma14="http://schemas.microsoft.com/office/mac/drawingml/2011/main" val="1"/>
                 </a:ext>
               </a:extLst>
             </p:spPr>
@@ -40776,7 +40652,7 @@
                 <a:effectLst/>
                 <a:extLst>
                   <a:ext uri="{C572A759-6A51-4108-AA02-DFA0A04FC94B}">
-                    <ma14:wrappingTextBoxFlag xmlns:ma14="http://schemas.microsoft.com/office/mac/drawingml/2011/main" xmlns:a14="http://schemas.microsoft.com/office/drawing/2010/main" xmlns:m="http://schemas.openxmlformats.org/officeDocument/2006/math" xmlns="" val="1"/>
+                    <ma14:wrappingTextBoxFlag xmlns="" xmlns:m="http://schemas.openxmlformats.org/officeDocument/2006/math" xmlns:a14="http://schemas.microsoft.com/office/drawing/2010/main" xmlns:ma14="http://schemas.microsoft.com/office/mac/drawingml/2011/main" val="1"/>
                   </a:ext>
                 </a:extLst>
               </p:spPr>
@@ -40824,7 +40700,7 @@
               <a:effectLst/>
               <a:extLst>
                 <a:ext uri="{C572A759-6A51-4108-AA02-DFA0A04FC94B}">
-                  <ma14:wrappingTextBoxFlag xmlns:ma14="http://schemas.microsoft.com/office/mac/drawingml/2011/main" xmlns:a14="http://schemas.microsoft.com/office/drawing/2010/main" xmlns:m="http://schemas.openxmlformats.org/officeDocument/2006/math" xmlns="" val="1"/>
+                  <ma14:wrappingTextBoxFlag xmlns="" xmlns:m="http://schemas.openxmlformats.org/officeDocument/2006/math" xmlns:a14="http://schemas.microsoft.com/office/drawing/2010/main" xmlns:ma14="http://schemas.microsoft.com/office/mac/drawingml/2011/main" val="1"/>
                 </a:ext>
               </a:extLst>
             </p:spPr>
@@ -41065,7 +40941,7 @@
                 <a:effectLst/>
                 <a:extLst>
                   <a:ext uri="{C572A759-6A51-4108-AA02-DFA0A04FC94B}">
-                    <ma14:wrappingTextBoxFlag xmlns:ma14="http://schemas.microsoft.com/office/mac/drawingml/2011/main" xmlns:a14="http://schemas.microsoft.com/office/drawing/2010/main" xmlns:m="http://schemas.openxmlformats.org/officeDocument/2006/math" xmlns="" val="1"/>
+                    <ma14:wrappingTextBoxFlag xmlns="" xmlns:m="http://schemas.openxmlformats.org/officeDocument/2006/math" xmlns:a14="http://schemas.microsoft.com/office/drawing/2010/main" xmlns:ma14="http://schemas.microsoft.com/office/mac/drawingml/2011/main" val="1"/>
                   </a:ext>
                 </a:extLst>
               </p:spPr>
@@ -41109,7 +40985,7 @@
               <a:effectLst/>
               <a:extLst>
                 <a:ext uri="{C572A759-6A51-4108-AA02-DFA0A04FC94B}">
-                  <ma14:wrappingTextBoxFlag xmlns:ma14="http://schemas.microsoft.com/office/mac/drawingml/2011/main" xmlns:a14="http://schemas.microsoft.com/office/drawing/2010/main" xmlns:m="http://schemas.openxmlformats.org/officeDocument/2006/math" xmlns="" val="1"/>
+                  <ma14:wrappingTextBoxFlag xmlns="" xmlns:m="http://schemas.openxmlformats.org/officeDocument/2006/math" xmlns:a14="http://schemas.microsoft.com/office/drawing/2010/main" xmlns:ma14="http://schemas.microsoft.com/office/mac/drawingml/2011/main" val="1"/>
                 </a:ext>
               </a:extLst>
             </p:spPr>
@@ -42904,7 +42780,7 @@
           </a:ln>
           <a:extLst>
             <a:ext uri="{C572A759-6A51-4108-AA02-DFA0A04FC94B}">
-              <ma14:wrappingTextBoxFlag xmlns:ma14="http://schemas.microsoft.com/office/mac/drawingml/2011/main" xmlns:a14="http://schemas.microsoft.com/office/drawing/2010/main" xmlns:m="http://schemas.openxmlformats.org/officeDocument/2006/math" xmlns="" val="1"/>
+              <ma14:wrappingTextBoxFlag xmlns="" xmlns:m="http://schemas.openxmlformats.org/officeDocument/2006/math" xmlns:a14="http://schemas.microsoft.com/office/drawing/2010/main" xmlns:ma14="http://schemas.microsoft.com/office/mac/drawingml/2011/main" val="1"/>
             </a:ext>
           </a:extLst>
         </p:spPr>
@@ -43164,7 +43040,7 @@
               <a:effectLst/>
               <a:extLst>
                 <a:ext uri="{C572A759-6A51-4108-AA02-DFA0A04FC94B}">
-                  <ma14:wrappingTextBoxFlag xmlns:ma14="http://schemas.microsoft.com/office/mac/drawingml/2011/main" xmlns:a14="http://schemas.microsoft.com/office/drawing/2010/main" xmlns:m="http://schemas.openxmlformats.org/officeDocument/2006/math" xmlns="" val="1"/>
+                  <ma14:wrappingTextBoxFlag xmlns="" xmlns:m="http://schemas.openxmlformats.org/officeDocument/2006/math" xmlns:a14="http://schemas.microsoft.com/office/drawing/2010/main" xmlns:ma14="http://schemas.microsoft.com/office/mac/drawingml/2011/main" val="1"/>
                 </a:ext>
               </a:extLst>
             </p:spPr>
@@ -43260,7 +43136,7 @@
           <a:effectLst/>
           <a:extLst>
             <a:ext uri="{C572A759-6A51-4108-AA02-DFA0A04FC94B}">
-              <ma14:wrappingTextBoxFlag xmlns="" xmlns:m="http://schemas.openxmlformats.org/officeDocument/2006/math" xmlns:a14="http://schemas.microsoft.com/office/drawing/2010/main" xmlns:ma14="http://schemas.microsoft.com/office/mac/drawingml/2011/main" val="1"/>
+              <ma14:wrappingTextBoxFlag xmlns:ma14="http://schemas.microsoft.com/office/mac/drawingml/2011/main" xmlns:a14="http://schemas.microsoft.com/office/drawing/2010/main" xmlns:m="http://schemas.openxmlformats.org/officeDocument/2006/math" xmlns="" val="1"/>
             </a:ext>
           </a:extLst>
         </p:spPr>
@@ -43314,7 +43190,7 @@
           <a:effectLst/>
           <a:extLst>
             <a:ext uri="{C572A759-6A51-4108-AA02-DFA0A04FC94B}">
-              <ma14:wrappingTextBoxFlag xmlns="" xmlns:m="http://schemas.openxmlformats.org/officeDocument/2006/math" xmlns:a14="http://schemas.microsoft.com/office/drawing/2010/main" xmlns:ma14="http://schemas.microsoft.com/office/mac/drawingml/2011/main" val="1"/>
+              <ma14:wrappingTextBoxFlag xmlns:ma14="http://schemas.microsoft.com/office/mac/drawingml/2011/main" xmlns:a14="http://schemas.microsoft.com/office/drawing/2010/main" xmlns:m="http://schemas.openxmlformats.org/officeDocument/2006/math" xmlns="" val="1"/>
             </a:ext>
           </a:extLst>
         </p:spPr>
@@ -43368,7 +43244,7 @@
           <a:effectLst/>
           <a:extLst>
             <a:ext uri="{C572A759-6A51-4108-AA02-DFA0A04FC94B}">
-              <ma14:wrappingTextBoxFlag xmlns="" xmlns:m="http://schemas.openxmlformats.org/officeDocument/2006/math" xmlns:a14="http://schemas.microsoft.com/office/drawing/2010/main" xmlns:ma14="http://schemas.microsoft.com/office/mac/drawingml/2011/main" val="1"/>
+              <ma14:wrappingTextBoxFlag xmlns:ma14="http://schemas.microsoft.com/office/mac/drawingml/2011/main" xmlns:a14="http://schemas.microsoft.com/office/drawing/2010/main" xmlns:m="http://schemas.openxmlformats.org/officeDocument/2006/math" xmlns="" val="1"/>
             </a:ext>
           </a:extLst>
         </p:spPr>
@@ -43638,7 +43514,7 @@
           <a:effectLst/>
           <a:extLst>
             <a:ext uri="{C572A759-6A51-4108-AA02-DFA0A04FC94B}">
-              <ma14:wrappingTextBoxFlag xmlns="" xmlns:m="http://schemas.openxmlformats.org/officeDocument/2006/math" xmlns:a14="http://schemas.microsoft.com/office/drawing/2010/main" xmlns:ma14="http://schemas.microsoft.com/office/mac/drawingml/2011/main" val="1"/>
+              <ma14:wrappingTextBoxFlag xmlns:ma14="http://schemas.microsoft.com/office/mac/drawingml/2011/main" xmlns:a14="http://schemas.microsoft.com/office/drawing/2010/main" xmlns:m="http://schemas.openxmlformats.org/officeDocument/2006/math" xmlns="" val="1"/>
             </a:ext>
           </a:extLst>
         </p:spPr>
@@ -43692,7 +43568,7 @@
           <a:effectLst/>
           <a:extLst>
             <a:ext uri="{C572A759-6A51-4108-AA02-DFA0A04FC94B}">
-              <ma14:wrappingTextBoxFlag xmlns="" xmlns:m="http://schemas.openxmlformats.org/officeDocument/2006/math" xmlns:a14="http://schemas.microsoft.com/office/drawing/2010/main" xmlns:ma14="http://schemas.microsoft.com/office/mac/drawingml/2011/main" val="1"/>
+              <ma14:wrappingTextBoxFlag xmlns:ma14="http://schemas.microsoft.com/office/mac/drawingml/2011/main" xmlns:a14="http://schemas.microsoft.com/office/drawing/2010/main" xmlns:m="http://schemas.openxmlformats.org/officeDocument/2006/math" xmlns="" val="1"/>
             </a:ext>
           </a:extLst>
         </p:spPr>
@@ -43746,7 +43622,7 @@
           <a:effectLst/>
           <a:extLst>
             <a:ext uri="{C572A759-6A51-4108-AA02-DFA0A04FC94B}">
-              <ma14:wrappingTextBoxFlag xmlns="" xmlns:m="http://schemas.openxmlformats.org/officeDocument/2006/math" xmlns:a14="http://schemas.microsoft.com/office/drawing/2010/main" xmlns:ma14="http://schemas.microsoft.com/office/mac/drawingml/2011/main" val="1"/>
+              <ma14:wrappingTextBoxFlag xmlns:ma14="http://schemas.microsoft.com/office/mac/drawingml/2011/main" xmlns:a14="http://schemas.microsoft.com/office/drawing/2010/main" xmlns:m="http://schemas.openxmlformats.org/officeDocument/2006/math" xmlns="" val="1"/>
             </a:ext>
           </a:extLst>
         </p:spPr>
@@ -43804,7 +43680,7 @@
           <a:effectLst/>
           <a:extLst>
             <a:ext uri="{C572A759-6A51-4108-AA02-DFA0A04FC94B}">
-              <ma14:wrappingTextBoxFlag xmlns="" xmlns:m="http://schemas.openxmlformats.org/officeDocument/2006/math" xmlns:a14="http://schemas.microsoft.com/office/drawing/2010/main" xmlns:ma14="http://schemas.microsoft.com/office/mac/drawingml/2011/main" val="1"/>
+              <ma14:wrappingTextBoxFlag xmlns:ma14="http://schemas.microsoft.com/office/mac/drawingml/2011/main" xmlns:a14="http://schemas.microsoft.com/office/drawing/2010/main" xmlns:m="http://schemas.openxmlformats.org/officeDocument/2006/math" xmlns="" val="1"/>
             </a:ext>
           </a:extLst>
         </p:spPr>
@@ -44266,7 +44142,7 @@
           <a:effectLst/>
           <a:extLst>
             <a:ext uri="{C572A759-6A51-4108-AA02-DFA0A04FC94B}">
-              <ma14:wrappingTextBoxFlag xmlns="" xmlns:m="http://schemas.openxmlformats.org/officeDocument/2006/math" xmlns:a14="http://schemas.microsoft.com/office/drawing/2010/main" xmlns:ma14="http://schemas.microsoft.com/office/mac/drawingml/2011/main" val="1"/>
+              <ma14:wrappingTextBoxFlag xmlns:ma14="http://schemas.microsoft.com/office/mac/drawingml/2011/main" xmlns:a14="http://schemas.microsoft.com/office/drawing/2010/main" xmlns:m="http://schemas.openxmlformats.org/officeDocument/2006/math" xmlns="" val="1"/>
             </a:ext>
           </a:extLst>
         </p:spPr>
@@ -45997,7 +45873,7 @@
                   </a:effectLst>
                   <a:extLst>
                     <a:ext uri="{C572A759-6A51-4108-AA02-DFA0A04FC94B}">
-                      <ma14:wrappingTextBoxFlag xmlns:ma14="http://schemas.microsoft.com/office/mac/drawingml/2011/main" xmlns:a14="http://schemas.microsoft.com/office/drawing/2010/main" xmlns:m="http://schemas.openxmlformats.org/officeDocument/2006/math" xmlns="" val="1"/>
+                      <ma14:wrappingTextBoxFlag xmlns="" xmlns:m="http://schemas.openxmlformats.org/officeDocument/2006/math" xmlns:a14="http://schemas.microsoft.com/office/drawing/2010/main" xmlns:ma14="http://schemas.microsoft.com/office/mac/drawingml/2011/main" val="1"/>
                     </a:ext>
                   </a:extLst>
                 </p:spPr>
@@ -46106,7 +45982,7 @@
                   </a:effectLst>
                   <a:extLst>
                     <a:ext uri="{C572A759-6A51-4108-AA02-DFA0A04FC94B}">
-                      <ma14:wrappingTextBoxFlag xmlns:ma14="http://schemas.microsoft.com/office/mac/drawingml/2011/main" xmlns:a14="http://schemas.microsoft.com/office/drawing/2010/main" xmlns:m="http://schemas.openxmlformats.org/officeDocument/2006/math" xmlns="" val="1"/>
+                      <ma14:wrappingTextBoxFlag xmlns="" xmlns:m="http://schemas.openxmlformats.org/officeDocument/2006/math" xmlns:a14="http://schemas.microsoft.com/office/drawing/2010/main" xmlns:ma14="http://schemas.microsoft.com/office/mac/drawingml/2011/main" val="1"/>
                     </a:ext>
                   </a:extLst>
                 </p:spPr>
@@ -46186,7 +46062,7 @@
                   </a:effectLst>
                   <a:extLst>
                     <a:ext uri="{C572A759-6A51-4108-AA02-DFA0A04FC94B}">
-                      <ma14:wrappingTextBoxFlag xmlns:ma14="http://schemas.microsoft.com/office/mac/drawingml/2011/main" xmlns:a14="http://schemas.microsoft.com/office/drawing/2010/main" xmlns:m="http://schemas.openxmlformats.org/officeDocument/2006/math" xmlns="" val="1"/>
+                      <ma14:wrappingTextBoxFlag xmlns="" xmlns:m="http://schemas.openxmlformats.org/officeDocument/2006/math" xmlns:a14="http://schemas.microsoft.com/office/drawing/2010/main" xmlns:ma14="http://schemas.microsoft.com/office/mac/drawingml/2011/main" val="1"/>
                     </a:ext>
                   </a:extLst>
                 </p:spPr>
@@ -46246,7 +46122,7 @@
                   <a:effectLst/>
                   <a:extLst>
                     <a:ext uri="{C572A759-6A51-4108-AA02-DFA0A04FC94B}">
-                      <ma14:wrappingTextBoxFlag xmlns:ma14="http://schemas.microsoft.com/office/mac/drawingml/2011/main" xmlns:a14="http://schemas.microsoft.com/office/drawing/2010/main" xmlns:m="http://schemas.openxmlformats.org/officeDocument/2006/math" xmlns="" val="1"/>
+                      <ma14:wrappingTextBoxFlag xmlns="" xmlns:m="http://schemas.openxmlformats.org/officeDocument/2006/math" xmlns:a14="http://schemas.microsoft.com/office/drawing/2010/main" xmlns:ma14="http://schemas.microsoft.com/office/mac/drawingml/2011/main" val="1"/>
                     </a:ext>
                   </a:extLst>
                 </p:spPr>
@@ -46515,7 +46391,7 @@
                 <a:effectLst/>
                 <a:extLst>
                   <a:ext uri="{C572A759-6A51-4108-AA02-DFA0A04FC94B}">
-                    <ma14:wrappingTextBoxFlag xmlns="" xmlns:m="http://schemas.openxmlformats.org/officeDocument/2006/math" xmlns:a14="http://schemas.microsoft.com/office/drawing/2010/main" xmlns:ma14="http://schemas.microsoft.com/office/mac/drawingml/2011/main" val="1"/>
+                    <ma14:wrappingTextBoxFlag xmlns:ma14="http://schemas.microsoft.com/office/mac/drawingml/2011/main" xmlns:a14="http://schemas.microsoft.com/office/drawing/2010/main" xmlns:m="http://schemas.openxmlformats.org/officeDocument/2006/math" xmlns="" val="1"/>
                   </a:ext>
                 </a:extLst>
               </p:spPr>
@@ -46574,7 +46450,7 @@
               </a:effectLst>
               <a:extLst>
                 <a:ext uri="{C572A759-6A51-4108-AA02-DFA0A04FC94B}">
-                  <ma14:wrappingTextBoxFlag xmlns:ma14="http://schemas.microsoft.com/office/mac/drawingml/2011/main" xmlns:a14="http://schemas.microsoft.com/office/drawing/2010/main" xmlns:m="http://schemas.openxmlformats.org/officeDocument/2006/math" xmlns="" val="1"/>
+                  <ma14:wrappingTextBoxFlag xmlns="" xmlns:m="http://schemas.openxmlformats.org/officeDocument/2006/math" xmlns:a14="http://schemas.microsoft.com/office/drawing/2010/main" xmlns:ma14="http://schemas.microsoft.com/office/mac/drawingml/2011/main" val="1"/>
                 </a:ext>
               </a:extLst>
             </p:spPr>

</xml_diff>